<commit_message>
more random changes. now figures are correct
</commit_message>
<xml_diff>
--- a/figures/Stuff.pptx
+++ b/figures/Stuff.pptx
@@ -292,7 +292,7 @@
           <a:p>
             <a:fld id="{ABB30920-ECF1-E646-BD10-1FA9366473F3}" type="datetimeFigureOut">
               <a:rPr lang="en-US" smtClean="0"/>
-              <a:t>7/6/14</a:t>
+              <a:t>10/15/14</a:t>
             </a:fld>
             <a:endParaRPr lang="en-US"/>
           </a:p>
@@ -462,7 +462,7 @@
           <a:p>
             <a:fld id="{ABB30920-ECF1-E646-BD10-1FA9366473F3}" type="datetimeFigureOut">
               <a:rPr lang="en-US" smtClean="0"/>
-              <a:t>7/6/14</a:t>
+              <a:t>10/15/14</a:t>
             </a:fld>
             <a:endParaRPr lang="en-US"/>
           </a:p>
@@ -642,7 +642,7 @@
           <a:p>
             <a:fld id="{ABB30920-ECF1-E646-BD10-1FA9366473F3}" type="datetimeFigureOut">
               <a:rPr lang="en-US" smtClean="0"/>
-              <a:t>7/6/14</a:t>
+              <a:t>10/15/14</a:t>
             </a:fld>
             <a:endParaRPr lang="en-US"/>
           </a:p>
@@ -812,7 +812,7 @@
           <a:p>
             <a:fld id="{ABB30920-ECF1-E646-BD10-1FA9366473F3}" type="datetimeFigureOut">
               <a:rPr lang="en-US" smtClean="0"/>
-              <a:t>7/6/14</a:t>
+              <a:t>10/15/14</a:t>
             </a:fld>
             <a:endParaRPr lang="en-US"/>
           </a:p>
@@ -1058,7 +1058,7 @@
           <a:p>
             <a:fld id="{ABB30920-ECF1-E646-BD10-1FA9366473F3}" type="datetimeFigureOut">
               <a:rPr lang="en-US" smtClean="0"/>
-              <a:t>7/6/14</a:t>
+              <a:t>10/15/14</a:t>
             </a:fld>
             <a:endParaRPr lang="en-US"/>
           </a:p>
@@ -1346,7 +1346,7 @@
           <a:p>
             <a:fld id="{ABB30920-ECF1-E646-BD10-1FA9366473F3}" type="datetimeFigureOut">
               <a:rPr lang="en-US" smtClean="0"/>
-              <a:t>7/6/14</a:t>
+              <a:t>10/15/14</a:t>
             </a:fld>
             <a:endParaRPr lang="en-US"/>
           </a:p>
@@ -1768,7 +1768,7 @@
           <a:p>
             <a:fld id="{ABB30920-ECF1-E646-BD10-1FA9366473F3}" type="datetimeFigureOut">
               <a:rPr lang="en-US" smtClean="0"/>
-              <a:t>7/6/14</a:t>
+              <a:t>10/15/14</a:t>
             </a:fld>
             <a:endParaRPr lang="en-US"/>
           </a:p>
@@ -1886,7 +1886,7 @@
           <a:p>
             <a:fld id="{ABB30920-ECF1-E646-BD10-1FA9366473F3}" type="datetimeFigureOut">
               <a:rPr lang="en-US" smtClean="0"/>
-              <a:t>7/6/14</a:t>
+              <a:t>10/15/14</a:t>
             </a:fld>
             <a:endParaRPr lang="en-US"/>
           </a:p>
@@ -1981,7 +1981,7 @@
           <a:p>
             <a:fld id="{ABB30920-ECF1-E646-BD10-1FA9366473F3}" type="datetimeFigureOut">
               <a:rPr lang="en-US" smtClean="0"/>
-              <a:t>7/6/14</a:t>
+              <a:t>10/15/14</a:t>
             </a:fld>
             <a:endParaRPr lang="en-US"/>
           </a:p>
@@ -2258,7 +2258,7 @@
           <a:p>
             <a:fld id="{ABB30920-ECF1-E646-BD10-1FA9366473F3}" type="datetimeFigureOut">
               <a:rPr lang="en-US" smtClean="0"/>
-              <a:t>7/6/14</a:t>
+              <a:t>10/15/14</a:t>
             </a:fld>
             <a:endParaRPr lang="en-US"/>
           </a:p>
@@ -2511,7 +2511,7 @@
           <a:p>
             <a:fld id="{ABB30920-ECF1-E646-BD10-1FA9366473F3}" type="datetimeFigureOut">
               <a:rPr lang="en-US" smtClean="0"/>
-              <a:t>7/6/14</a:t>
+              <a:t>10/15/14</a:t>
             </a:fld>
             <a:endParaRPr lang="en-US"/>
           </a:p>
@@ -2724,7 +2724,7 @@
           <a:p>
             <a:fld id="{ABB30920-ECF1-E646-BD10-1FA9366473F3}" type="datetimeFigureOut">
               <a:rPr lang="en-US" smtClean="0"/>
-              <a:t>7/6/14</a:t>
+              <a:t>10/15/14</a:t>
             </a:fld>
             <a:endParaRPr lang="en-US"/>
           </a:p>
@@ -7913,14 +7913,14 @@
       </p:grpSpPr>
       <p:sp>
         <p:nvSpPr>
-          <p:cNvPr id="113" name="Oval 112"/>
+          <p:cNvPr id="118" name="Oval 117"/>
           <p:cNvSpPr/>
           <p:nvPr/>
         </p:nvSpPr>
         <p:spPr>
           <a:xfrm>
-            <a:off x="3845325" y="2518119"/>
-            <a:ext cx="2843061" cy="2894176"/>
+            <a:off x="6245948" y="1953774"/>
+            <a:ext cx="1090084" cy="635000"/>
           </a:xfrm>
           <a:prstGeom prst="ellipse">
             <a:avLst/>
@@ -7954,14 +7954,14 @@
       </p:sp>
       <p:sp>
         <p:nvSpPr>
-          <p:cNvPr id="80" name="Oval 79"/>
+          <p:cNvPr id="117" name="Oval 116"/>
           <p:cNvSpPr/>
           <p:nvPr/>
         </p:nvSpPr>
         <p:spPr>
           <a:xfrm>
-            <a:off x="241768" y="710056"/>
-            <a:ext cx="3251888" cy="3979333"/>
+            <a:off x="4437878" y="317497"/>
+            <a:ext cx="2285167" cy="984254"/>
           </a:xfrm>
           <a:prstGeom prst="ellipse">
             <a:avLst/>
@@ -7989,27 +7989,24 @@
           <a:lstStyle/>
           <a:p>
             <a:pPr algn="ctr"/>
-            <a:endParaRPr lang="en-US"/>
-          </a:p>
-        </p:txBody>
-      </p:sp>
-      <p:sp>
-        <p:nvSpPr>
-          <p:cNvPr id="118" name="Oval 117"/>
+            <a:endParaRPr lang="en-US" b="1" dirty="0"/>
+          </a:p>
+        </p:txBody>
+      </p:sp>
+      <p:sp>
+        <p:nvSpPr>
+          <p:cNvPr id="20" name="Rectangle 19"/>
           <p:cNvSpPr/>
           <p:nvPr/>
         </p:nvSpPr>
         <p:spPr>
           <a:xfrm>
-            <a:off x="5831846" y="1775369"/>
-            <a:ext cx="1090084" cy="635000"/>
-          </a:xfrm>
-          <a:prstGeom prst="ellipse">
-            <a:avLst/>
-          </a:prstGeom>
-          <a:ln>
-            <a:prstDash val="sysDash"/>
-          </a:ln>
+            <a:off x="4727659" y="518584"/>
+            <a:ext cx="1684952" cy="583414"/>
+          </a:xfrm>
+          <a:prstGeom prst="rect">
+            <a:avLst/>
+          </a:prstGeom>
         </p:spPr>
         <p:style>
           <a:lnRef idx="2">
@@ -8030,27 +8027,28 @@
           <a:lstStyle/>
           <a:p>
             <a:pPr algn="ctr"/>
-            <a:endParaRPr lang="en-US"/>
-          </a:p>
-        </p:txBody>
-      </p:sp>
-      <p:sp>
-        <p:nvSpPr>
-          <p:cNvPr id="117" name="Oval 116"/>
+            <a:r>
+              <a:rPr lang="en-US" dirty="0" smtClean="0"/>
+              <a:t>Memory subsystem</a:t>
+            </a:r>
+            <a:endParaRPr lang="en-US" dirty="0"/>
+          </a:p>
+        </p:txBody>
+      </p:sp>
+      <p:sp>
+        <p:nvSpPr>
+          <p:cNvPr id="22" name="Rectangle 21"/>
           <p:cNvSpPr/>
           <p:nvPr/>
         </p:nvSpPr>
         <p:spPr>
           <a:xfrm>
-            <a:off x="3679436" y="431284"/>
-            <a:ext cx="3513666" cy="1354667"/>
-          </a:xfrm>
-          <a:prstGeom prst="ellipse">
-            <a:avLst/>
-          </a:prstGeom>
-          <a:ln>
-            <a:prstDash val="lgDash"/>
-          </a:ln>
+            <a:off x="3465825" y="2092638"/>
+            <a:ext cx="1277235" cy="322531"/>
+          </a:xfrm>
+          <a:prstGeom prst="rect">
+            <a:avLst/>
+          </a:prstGeom>
         </p:spPr>
         <p:style>
           <a:lnRef idx="2">
@@ -8067,24 +8065,32 @@
           </a:fontRef>
         </p:style>
         <p:txBody>
-          <a:bodyPr rtlCol="0" anchor="ctr"/>
+          <a:bodyPr rtlCol="0" anchor="b"/>
           <a:lstStyle/>
           <a:p>
             <a:pPr algn="ctr"/>
-            <a:endParaRPr lang="en-US" b="1" dirty="0"/>
-          </a:p>
-        </p:txBody>
-      </p:sp>
-      <p:sp>
-        <p:nvSpPr>
-          <p:cNvPr id="20" name="Rectangle 19"/>
+            <a:r>
+              <a:rPr lang="en-US" dirty="0" smtClean="0"/>
+              <a:t>Processor</a:t>
+            </a:r>
+            <a:r>
+              <a:rPr lang="en-US" baseline="-25000" dirty="0" smtClean="0"/>
+              <a:t>1</a:t>
+            </a:r>
+            <a:endParaRPr lang="en-US" baseline="-25000" dirty="0"/>
+          </a:p>
+        </p:txBody>
+      </p:sp>
+      <p:sp>
+        <p:nvSpPr>
+          <p:cNvPr id="26" name="Rectangle 25"/>
           <p:cNvSpPr/>
           <p:nvPr/>
         </p:nvSpPr>
         <p:spPr>
           <a:xfrm>
-            <a:off x="4727659" y="599554"/>
-            <a:ext cx="1684952" cy="502443"/>
+            <a:off x="4948648" y="2106434"/>
+            <a:ext cx="756758" cy="328410"/>
           </a:xfrm>
           <a:prstGeom prst="rect">
             <a:avLst/>
@@ -8105,594 +8111,19 @@
           </a:fontRef>
         </p:style>
         <p:txBody>
-          <a:bodyPr rtlCol="0" anchor="ctr"/>
+          <a:bodyPr rtlCol="0" anchor="b"/>
           <a:lstStyle/>
           <a:p>
             <a:pPr algn="ctr"/>
             <a:r>
               <a:rPr lang="en-US" dirty="0" smtClean="0"/>
-              <a:t>Memory</a:t>
-            </a:r>
-            <a:endParaRPr lang="en-US" dirty="0"/>
-          </a:p>
-        </p:txBody>
-      </p:sp>
-      <p:sp>
-        <p:nvSpPr>
-          <p:cNvPr id="22" name="Rectangle 21"/>
-          <p:cNvSpPr/>
-          <p:nvPr/>
-        </p:nvSpPr>
-        <p:spPr>
-          <a:xfrm>
-            <a:off x="3912207" y="1931373"/>
-            <a:ext cx="756758" cy="322531"/>
-          </a:xfrm>
-          <a:prstGeom prst="rect">
-            <a:avLst/>
-          </a:prstGeom>
-        </p:spPr>
-        <p:style>
-          <a:lnRef idx="2">
-            <a:schemeClr val="dk1"/>
-          </a:lnRef>
-          <a:fillRef idx="1">
-            <a:schemeClr val="lt1"/>
-          </a:fillRef>
-          <a:effectRef idx="0">
-            <a:schemeClr val="dk1"/>
-          </a:effectRef>
-          <a:fontRef idx="minor">
-            <a:schemeClr val="dk1"/>
-          </a:fontRef>
-        </p:style>
-        <p:txBody>
-          <a:bodyPr rtlCol="0" anchor="b"/>
-          <a:lstStyle/>
-          <a:p>
-            <a:pPr algn="ctr"/>
-            <a:r>
-              <a:rPr lang="en-US" dirty="0" smtClean="0"/>
-              <a:t>Proc</a:t>
-            </a:r>
-            <a:r>
-              <a:rPr lang="en-US" baseline="-25000" dirty="0"/>
-              <a:t>1</a:t>
-            </a:r>
-          </a:p>
-        </p:txBody>
-      </p:sp>
-      <p:sp>
-        <p:nvSpPr>
-          <p:cNvPr id="4" name="Oval 3"/>
-          <p:cNvSpPr/>
-          <p:nvPr/>
-        </p:nvSpPr>
-        <p:spPr>
-          <a:xfrm>
-            <a:off x="1503435" y="2049994"/>
-            <a:ext cx="347411" cy="391244"/>
-          </a:xfrm>
-          <a:prstGeom prst="ellipse">
-            <a:avLst/>
-          </a:prstGeom>
-        </p:spPr>
-        <p:style>
-          <a:lnRef idx="2">
-            <a:schemeClr val="dk1"/>
-          </a:lnRef>
-          <a:fillRef idx="1">
-            <a:schemeClr val="lt1"/>
-          </a:fillRef>
-          <a:effectRef idx="0">
-            <a:schemeClr val="dk1"/>
-          </a:effectRef>
-          <a:fontRef idx="minor">
-            <a:schemeClr val="dk1"/>
-          </a:fontRef>
-        </p:style>
-        <p:txBody>
-          <a:bodyPr rtlCol="0" anchor="ctr"/>
-          <a:lstStyle/>
-          <a:p>
-            <a:pPr algn="ctr"/>
-            <a:endParaRPr lang="en-US"/>
-          </a:p>
-        </p:txBody>
-      </p:sp>
-      <p:sp>
-        <p:nvSpPr>
-          <p:cNvPr id="5" name="Oval 4"/>
-          <p:cNvSpPr/>
-          <p:nvPr/>
-        </p:nvSpPr>
-        <p:spPr>
-          <a:xfrm>
-            <a:off x="850035" y="2466136"/>
-            <a:ext cx="347411" cy="391244"/>
-          </a:xfrm>
-          <a:prstGeom prst="ellipse">
-            <a:avLst/>
-          </a:prstGeom>
-        </p:spPr>
-        <p:style>
-          <a:lnRef idx="2">
-            <a:schemeClr val="dk1"/>
-          </a:lnRef>
-          <a:fillRef idx="1">
-            <a:schemeClr val="lt1"/>
-          </a:fillRef>
-          <a:effectRef idx="0">
-            <a:schemeClr val="dk1"/>
-          </a:effectRef>
-          <a:fontRef idx="minor">
-            <a:schemeClr val="dk1"/>
-          </a:fontRef>
-        </p:style>
-        <p:txBody>
-          <a:bodyPr rtlCol="0" anchor="ctr"/>
-          <a:lstStyle/>
-          <a:p>
-            <a:pPr algn="ctr"/>
-            <a:endParaRPr lang="en-US"/>
-          </a:p>
-        </p:txBody>
-      </p:sp>
-      <p:sp>
-        <p:nvSpPr>
-          <p:cNvPr id="6" name="Oval 5"/>
-          <p:cNvSpPr/>
-          <p:nvPr/>
-        </p:nvSpPr>
-        <p:spPr>
-          <a:xfrm>
-            <a:off x="1436164" y="2569093"/>
-            <a:ext cx="347411" cy="391244"/>
-          </a:xfrm>
-          <a:prstGeom prst="ellipse">
-            <a:avLst/>
-          </a:prstGeom>
-        </p:spPr>
-        <p:style>
-          <a:lnRef idx="2">
-            <a:schemeClr val="dk1"/>
-          </a:lnRef>
-          <a:fillRef idx="1">
-            <a:schemeClr val="lt1"/>
-          </a:fillRef>
-          <a:effectRef idx="0">
-            <a:schemeClr val="dk1"/>
-          </a:effectRef>
-          <a:fontRef idx="minor">
-            <a:schemeClr val="dk1"/>
-          </a:fontRef>
-        </p:style>
-        <p:txBody>
-          <a:bodyPr rtlCol="0" anchor="ctr"/>
-          <a:lstStyle/>
-          <a:p>
-            <a:pPr algn="ctr"/>
-            <a:endParaRPr lang="en-US"/>
-          </a:p>
-        </p:txBody>
-      </p:sp>
-      <p:sp>
-        <p:nvSpPr>
-          <p:cNvPr id="7" name="Oval 6"/>
-          <p:cNvSpPr/>
-          <p:nvPr/>
-        </p:nvSpPr>
-        <p:spPr>
-          <a:xfrm>
-            <a:off x="2362827" y="3121193"/>
-            <a:ext cx="347411" cy="391244"/>
-          </a:xfrm>
-          <a:prstGeom prst="ellipse">
-            <a:avLst/>
-          </a:prstGeom>
-        </p:spPr>
-        <p:style>
-          <a:lnRef idx="2">
-            <a:schemeClr val="dk1"/>
-          </a:lnRef>
-          <a:fillRef idx="1">
-            <a:schemeClr val="lt1"/>
-          </a:fillRef>
-          <a:effectRef idx="0">
-            <a:schemeClr val="dk1"/>
-          </a:effectRef>
-          <a:fontRef idx="minor">
-            <a:schemeClr val="dk1"/>
-          </a:fontRef>
-        </p:style>
-        <p:txBody>
-          <a:bodyPr rtlCol="0" anchor="ctr"/>
-          <a:lstStyle/>
-          <a:p>
-            <a:pPr algn="ctr"/>
-            <a:endParaRPr lang="en-US"/>
-          </a:p>
-        </p:txBody>
-      </p:sp>
-      <p:cxnSp>
-        <p:nvCxnSpPr>
-          <p:cNvPr id="8" name="Straight Connector 7"/>
-          <p:cNvCxnSpPr>
-            <a:stCxn id="4" idx="3"/>
-            <a:endCxn id="5" idx="0"/>
-          </p:cNvCxnSpPr>
-          <p:nvPr/>
-        </p:nvCxnSpPr>
-        <p:spPr>
-          <a:xfrm flipH="1">
-            <a:off x="1023741" y="2383942"/>
-            <a:ext cx="530571" cy="82194"/>
-          </a:xfrm>
-          <a:prstGeom prst="line">
-            <a:avLst/>
-          </a:prstGeom>
-        </p:spPr>
-        <p:style>
-          <a:lnRef idx="2">
-            <a:schemeClr val="dk1"/>
-          </a:lnRef>
-          <a:fillRef idx="1">
-            <a:schemeClr val="lt1"/>
-          </a:fillRef>
-          <a:effectRef idx="0">
-            <a:schemeClr val="dk1"/>
-          </a:effectRef>
-          <a:fontRef idx="minor">
-            <a:schemeClr val="dk1"/>
-          </a:fontRef>
-        </p:style>
-      </p:cxnSp>
-      <p:cxnSp>
-        <p:nvCxnSpPr>
-          <p:cNvPr id="9" name="Straight Connector 8"/>
-          <p:cNvCxnSpPr>
-            <a:stCxn id="4" idx="4"/>
-            <a:endCxn id="6" idx="0"/>
-          </p:cNvCxnSpPr>
-          <p:nvPr/>
-        </p:nvCxnSpPr>
-        <p:spPr>
-          <a:xfrm flipH="1">
-            <a:off x="1609870" y="2441238"/>
-            <a:ext cx="67271" cy="127855"/>
-          </a:xfrm>
-          <a:prstGeom prst="line">
-            <a:avLst/>
-          </a:prstGeom>
-        </p:spPr>
-        <p:style>
-          <a:lnRef idx="2">
-            <a:schemeClr val="dk1"/>
-          </a:lnRef>
-          <a:fillRef idx="1">
-            <a:schemeClr val="lt1"/>
-          </a:fillRef>
-          <a:effectRef idx="0">
-            <a:schemeClr val="dk1"/>
-          </a:effectRef>
-          <a:fontRef idx="minor">
-            <a:schemeClr val="dk1"/>
-          </a:fontRef>
-        </p:style>
-      </p:cxnSp>
-      <p:cxnSp>
-        <p:nvCxnSpPr>
-          <p:cNvPr id="10" name="Straight Connector 9"/>
-          <p:cNvCxnSpPr>
-            <a:stCxn id="4" idx="5"/>
-            <a:endCxn id="7" idx="1"/>
-          </p:cNvCxnSpPr>
-          <p:nvPr/>
-        </p:nvCxnSpPr>
-        <p:spPr>
-          <a:xfrm>
-            <a:off x="1799969" y="2383942"/>
-            <a:ext cx="613735" cy="794547"/>
-          </a:xfrm>
-          <a:prstGeom prst="line">
-            <a:avLst/>
-          </a:prstGeom>
-        </p:spPr>
-        <p:style>
-          <a:lnRef idx="2">
-            <a:schemeClr val="dk1"/>
-          </a:lnRef>
-          <a:fillRef idx="1">
-            <a:schemeClr val="lt1"/>
-          </a:fillRef>
-          <a:effectRef idx="0">
-            <a:schemeClr val="dk1"/>
-          </a:effectRef>
-          <a:fontRef idx="minor">
-            <a:schemeClr val="dk1"/>
-          </a:fontRef>
-        </p:style>
-      </p:cxnSp>
-      <p:cxnSp>
-        <p:nvCxnSpPr>
-          <p:cNvPr id="12" name="Straight Connector 11"/>
-          <p:cNvCxnSpPr>
-            <a:stCxn id="5" idx="3"/>
-          </p:cNvCxnSpPr>
-          <p:nvPr/>
-        </p:nvCxnSpPr>
-        <p:spPr>
-          <a:xfrm flipH="1">
-            <a:off x="850035" y="2800084"/>
-            <a:ext cx="50877" cy="235100"/>
-          </a:xfrm>
-          <a:prstGeom prst="line">
-            <a:avLst/>
-          </a:prstGeom>
-        </p:spPr>
-        <p:style>
-          <a:lnRef idx="2">
-            <a:schemeClr val="dk1"/>
-          </a:lnRef>
-          <a:fillRef idx="1">
-            <a:schemeClr val="lt1"/>
-          </a:fillRef>
-          <a:effectRef idx="0">
-            <a:schemeClr val="dk1"/>
-          </a:effectRef>
-          <a:fontRef idx="minor">
-            <a:schemeClr val="dk1"/>
-          </a:fontRef>
-        </p:style>
-      </p:cxnSp>
-      <p:sp>
-        <p:nvSpPr>
-          <p:cNvPr id="13" name="Oval 12"/>
-          <p:cNvSpPr/>
-          <p:nvPr/>
-        </p:nvSpPr>
-        <p:spPr>
-          <a:xfrm>
-            <a:off x="676330" y="3031250"/>
-            <a:ext cx="347411" cy="391244"/>
-          </a:xfrm>
-          <a:prstGeom prst="ellipse">
-            <a:avLst/>
-          </a:prstGeom>
-        </p:spPr>
-        <p:style>
-          <a:lnRef idx="2">
-            <a:schemeClr val="dk1"/>
-          </a:lnRef>
-          <a:fillRef idx="1">
-            <a:schemeClr val="lt1"/>
-          </a:fillRef>
-          <a:effectRef idx="0">
-            <a:schemeClr val="dk1"/>
-          </a:effectRef>
-          <a:fontRef idx="minor">
-            <a:schemeClr val="dk1"/>
-          </a:fontRef>
-        </p:style>
-        <p:txBody>
-          <a:bodyPr rtlCol="0" anchor="ctr"/>
-          <a:lstStyle/>
-          <a:p>
-            <a:pPr algn="ctr"/>
-            <a:endParaRPr lang="en-US" sz="2000" dirty="0"/>
-          </a:p>
-        </p:txBody>
-      </p:sp>
-      <p:cxnSp>
-        <p:nvCxnSpPr>
-          <p:cNvPr id="14" name="Straight Connector 13"/>
-          <p:cNvCxnSpPr>
-            <a:stCxn id="6" idx="5"/>
-            <a:endCxn id="15" idx="0"/>
-          </p:cNvCxnSpPr>
-          <p:nvPr/>
-        </p:nvCxnSpPr>
-        <p:spPr>
-          <a:xfrm flipH="1">
-            <a:off x="1732697" y="2903041"/>
-            <a:ext cx="1" cy="218152"/>
-          </a:xfrm>
-          <a:prstGeom prst="line">
-            <a:avLst/>
-          </a:prstGeom>
-        </p:spPr>
-        <p:style>
-          <a:lnRef idx="2">
-            <a:schemeClr val="dk1"/>
-          </a:lnRef>
-          <a:fillRef idx="1">
-            <a:schemeClr val="lt1"/>
-          </a:fillRef>
-          <a:effectRef idx="0">
-            <a:schemeClr val="dk1"/>
-          </a:effectRef>
-          <a:fontRef idx="minor">
-            <a:schemeClr val="dk1"/>
-          </a:fontRef>
-        </p:style>
-      </p:cxnSp>
-      <p:sp>
-        <p:nvSpPr>
-          <p:cNvPr id="15" name="Oval 14"/>
-          <p:cNvSpPr/>
-          <p:nvPr/>
-        </p:nvSpPr>
-        <p:spPr>
-          <a:xfrm>
-            <a:off x="1558991" y="3121193"/>
-            <a:ext cx="347411" cy="391244"/>
-          </a:xfrm>
-          <a:prstGeom prst="ellipse">
-            <a:avLst/>
-          </a:prstGeom>
-        </p:spPr>
-        <p:style>
-          <a:lnRef idx="2">
-            <a:schemeClr val="dk1"/>
-          </a:lnRef>
-          <a:fillRef idx="1">
-            <a:schemeClr val="lt1"/>
-          </a:fillRef>
-          <a:effectRef idx="0">
-            <a:schemeClr val="dk1"/>
-          </a:effectRef>
-          <a:fontRef idx="minor">
-            <a:schemeClr val="dk1"/>
-          </a:fontRef>
-        </p:style>
-        <p:txBody>
-          <a:bodyPr rtlCol="0" anchor="ctr"/>
-          <a:lstStyle/>
-          <a:p>
-            <a:pPr algn="ctr"/>
-            <a:endParaRPr lang="en-US"/>
-          </a:p>
-        </p:txBody>
-      </p:sp>
-      <p:cxnSp>
-        <p:nvCxnSpPr>
-          <p:cNvPr id="21" name="Straight Connector 20"/>
-          <p:cNvCxnSpPr>
-            <a:stCxn id="4" idx="0"/>
-          </p:cNvCxnSpPr>
-          <p:nvPr/>
-        </p:nvCxnSpPr>
-        <p:spPr>
-          <a:xfrm flipH="1" flipV="1">
-            <a:off x="1433486" y="1476066"/>
-            <a:ext cx="243655" cy="573928"/>
-          </a:xfrm>
-          <a:prstGeom prst="line">
-            <a:avLst/>
-          </a:prstGeom>
-          <a:ln/>
-        </p:spPr>
-        <p:style>
-          <a:lnRef idx="2">
-            <a:schemeClr val="dk1"/>
-          </a:lnRef>
-          <a:fillRef idx="1">
-            <a:schemeClr val="lt1"/>
-          </a:fillRef>
-          <a:effectRef idx="0">
-            <a:schemeClr val="dk1"/>
-          </a:effectRef>
-          <a:fontRef idx="minor">
-            <a:schemeClr val="dk1"/>
-          </a:fontRef>
-        </p:style>
-      </p:cxnSp>
-      <p:cxnSp>
-        <p:nvCxnSpPr>
-          <p:cNvPr id="23" name="Straight Connector 22"/>
-          <p:cNvCxnSpPr/>
-          <p:nvPr/>
-        </p:nvCxnSpPr>
-        <p:spPr>
-          <a:xfrm flipV="1">
-            <a:off x="831637" y="3409481"/>
-            <a:ext cx="10256" cy="298006"/>
-          </a:xfrm>
-          <a:prstGeom prst="line">
-            <a:avLst/>
-          </a:prstGeom>
-          <a:ln/>
-        </p:spPr>
-        <p:style>
-          <a:lnRef idx="2">
-            <a:schemeClr val="dk1"/>
-          </a:lnRef>
-          <a:fillRef idx="1">
-            <a:schemeClr val="lt1"/>
-          </a:fillRef>
-          <a:effectRef idx="0">
-            <a:schemeClr val="dk1"/>
-          </a:effectRef>
-          <a:fontRef idx="minor">
-            <a:schemeClr val="dk1"/>
-          </a:fontRef>
-        </p:style>
-      </p:cxnSp>
-      <p:cxnSp>
-        <p:nvCxnSpPr>
-          <p:cNvPr id="24" name="Straight Connector 23"/>
-          <p:cNvCxnSpPr>
-            <a:endCxn id="15" idx="4"/>
-          </p:cNvCxnSpPr>
-          <p:nvPr/>
-        </p:nvCxnSpPr>
-        <p:spPr>
-          <a:xfrm flipH="1" flipV="1">
-            <a:off x="1732697" y="3512437"/>
-            <a:ext cx="1" cy="298006"/>
-          </a:xfrm>
-          <a:prstGeom prst="line">
-            <a:avLst/>
-          </a:prstGeom>
-          <a:ln/>
-        </p:spPr>
-        <p:style>
-          <a:lnRef idx="2">
-            <a:schemeClr val="dk1"/>
-          </a:lnRef>
-          <a:fillRef idx="1">
-            <a:schemeClr val="lt1"/>
-          </a:fillRef>
-          <a:effectRef idx="0">
-            <a:schemeClr val="dk1"/>
-          </a:effectRef>
-          <a:fontRef idx="minor">
-            <a:schemeClr val="dk1"/>
-          </a:fontRef>
-        </p:style>
-      </p:cxnSp>
-      <p:sp>
-        <p:nvSpPr>
-          <p:cNvPr id="26" name="Rectangle 25"/>
-          <p:cNvSpPr/>
-          <p:nvPr/>
-        </p:nvSpPr>
-        <p:spPr>
-          <a:xfrm>
-            <a:off x="5009150" y="1925494"/>
-            <a:ext cx="756758" cy="328410"/>
-          </a:xfrm>
-          <a:prstGeom prst="rect">
-            <a:avLst/>
-          </a:prstGeom>
-        </p:spPr>
-        <p:style>
-          <a:lnRef idx="2">
-            <a:schemeClr val="dk1"/>
-          </a:lnRef>
-          <a:fillRef idx="1">
-            <a:schemeClr val="lt1"/>
-          </a:fillRef>
-          <a:effectRef idx="0">
-            <a:schemeClr val="dk1"/>
-          </a:effectRef>
-          <a:fontRef idx="minor">
-            <a:schemeClr val="dk1"/>
-          </a:fontRef>
-        </p:style>
-        <p:txBody>
-          <a:bodyPr rtlCol="0" anchor="b"/>
-          <a:lstStyle/>
-          <a:p>
-            <a:pPr algn="ctr"/>
-            <a:r>
-              <a:rPr lang="en-US" dirty="0" smtClean="0"/>
-              <a:t>Proc</a:t>
-            </a:r>
-            <a:r>
-              <a:rPr lang="en-US" baseline="-25000" dirty="0"/>
+              <a:t>P</a:t>
+            </a:r>
+            <a:r>
+              <a:rPr lang="en-US" baseline="-25000" dirty="0" smtClean="0"/>
               <a:t>2</a:t>
             </a:r>
+            <a:endParaRPr lang="en-US" baseline="-25000" dirty="0"/>
           </a:p>
         </p:txBody>
       </p:sp>
@@ -8700,14 +8131,15 @@
         <p:nvCxnSpPr>
           <p:cNvPr id="28" name="Straight Connector 27"/>
           <p:cNvCxnSpPr>
+            <a:stCxn id="102" idx="2"/>
             <a:endCxn id="22" idx="0"/>
           </p:cNvCxnSpPr>
           <p:nvPr/>
         </p:nvCxnSpPr>
         <p:spPr>
           <a:xfrm flipH="1">
-            <a:off x="4290586" y="1628993"/>
-            <a:ext cx="258045" cy="302380"/>
+            <a:off x="4104443" y="1917970"/>
+            <a:ext cx="179519" cy="174668"/>
           </a:xfrm>
           <a:prstGeom prst="line">
             <a:avLst/>
@@ -8732,14 +8164,15 @@
         <p:nvCxnSpPr>
           <p:cNvPr id="31" name="Straight Connector 30"/>
           <p:cNvCxnSpPr>
+            <a:stCxn id="122" idx="2"/>
             <a:endCxn id="26" idx="0"/>
           </p:cNvCxnSpPr>
           <p:nvPr/>
         </p:nvCxnSpPr>
         <p:spPr>
-          <a:xfrm flipH="1">
-            <a:off x="5387529" y="1628993"/>
-            <a:ext cx="35724" cy="296501"/>
+          <a:xfrm>
+            <a:off x="5327027" y="1906820"/>
+            <a:ext cx="0" cy="199614"/>
           </a:xfrm>
           <a:prstGeom prst="line">
             <a:avLst/>
@@ -8760,21 +8193,20 @@
           </a:fontRef>
         </p:style>
       </p:cxnSp>
-      <p:cxnSp>
-        <p:nvCxnSpPr>
-          <p:cNvPr id="48" name="Straight Connector 47"/>
-          <p:cNvCxnSpPr/>
-          <p:nvPr/>
-        </p:nvCxnSpPr>
-        <p:spPr>
-          <a:xfrm flipH="1" flipV="1">
-            <a:off x="2550581" y="3512437"/>
-            <a:ext cx="1" cy="298006"/>
-          </a:xfrm>
-          <a:prstGeom prst="line">
-            <a:avLst/>
-          </a:prstGeom>
-          <a:ln/>
+      <p:sp>
+        <p:nvSpPr>
+          <p:cNvPr id="50" name="Rectangle 49"/>
+          <p:cNvSpPr/>
+          <p:nvPr/>
+        </p:nvSpPr>
+        <p:spPr>
+          <a:xfrm>
+            <a:off x="6412611" y="2086759"/>
+            <a:ext cx="756758" cy="328410"/>
+          </a:xfrm>
+          <a:prstGeom prst="rect">
+            <a:avLst/>
+          </a:prstGeom>
         </p:spPr>
         <p:style>
           <a:lnRef idx="2">
@@ -8790,19 +8222,38 @@
             <a:schemeClr val="dk1"/>
           </a:fontRef>
         </p:style>
-      </p:cxnSp>
-      <p:sp>
-        <p:nvSpPr>
-          <p:cNvPr id="50" name="Rectangle 49"/>
-          <p:cNvSpPr/>
-          <p:nvPr/>
-        </p:nvSpPr>
-        <p:spPr>
-          <a:xfrm>
-            <a:off x="5998509" y="1939737"/>
-            <a:ext cx="756758" cy="328410"/>
-          </a:xfrm>
-          <a:prstGeom prst="rect">
+        <p:txBody>
+          <a:bodyPr rtlCol="0" anchor="b"/>
+          <a:lstStyle/>
+          <a:p>
+            <a:pPr algn="ctr"/>
+            <a:r>
+              <a:rPr lang="en-US" dirty="0" smtClean="0"/>
+              <a:t>P</a:t>
+            </a:r>
+            <a:r>
+              <a:rPr lang="en-US" baseline="-25000" dirty="0" smtClean="0"/>
+              <a:t>i</a:t>
+            </a:r>
+            <a:endParaRPr lang="en-US" baseline="-25000" dirty="0"/>
+          </a:p>
+        </p:txBody>
+      </p:sp>
+      <p:cxnSp>
+        <p:nvCxnSpPr>
+          <p:cNvPr id="51" name="Straight Connector 50"/>
+          <p:cNvCxnSpPr>
+            <a:stCxn id="123" idx="2"/>
+            <a:endCxn id="50" idx="0"/>
+          </p:cNvCxnSpPr>
+          <p:nvPr/>
+        </p:nvCxnSpPr>
+        <p:spPr>
+          <a:xfrm>
+            <a:off x="6479937" y="1901318"/>
+            <a:ext cx="311053" cy="185441"/>
+          </a:xfrm>
+          <a:prstGeom prst="line">
             <a:avLst/>
           </a:prstGeom>
         </p:spPr>
@@ -8820,36 +8271,19 @@
             <a:schemeClr val="dk1"/>
           </a:fontRef>
         </p:style>
-        <p:txBody>
-          <a:bodyPr rtlCol="0" anchor="b"/>
-          <a:lstStyle/>
-          <a:p>
-            <a:pPr algn="ctr"/>
-            <a:r>
-              <a:rPr lang="en-US" dirty="0" smtClean="0"/>
-              <a:t>Proc</a:t>
-            </a:r>
-            <a:r>
-              <a:rPr lang="en-US" baseline="-25000" dirty="0"/>
-              <a:t>3</a:t>
-            </a:r>
-          </a:p>
-        </p:txBody>
-      </p:sp>
-      <p:cxnSp>
-        <p:nvCxnSpPr>
-          <p:cNvPr id="51" name="Straight Connector 50"/>
-          <p:cNvCxnSpPr>
-            <a:endCxn id="50" idx="0"/>
-          </p:cNvCxnSpPr>
-          <p:nvPr/>
-        </p:nvCxnSpPr>
-        <p:spPr>
-          <a:xfrm>
-            <a:off x="6222514" y="1633850"/>
-            <a:ext cx="154374" cy="305887"/>
-          </a:xfrm>
-          <a:prstGeom prst="line">
+      </p:cxnSp>
+      <p:sp>
+        <p:nvSpPr>
+          <p:cNvPr id="102" name="Rectangle 101"/>
+          <p:cNvSpPr/>
+          <p:nvPr/>
+        </p:nvSpPr>
+        <p:spPr>
+          <a:xfrm>
+            <a:off x="3786090" y="1301751"/>
+            <a:ext cx="995743" cy="616219"/>
+          </a:xfrm>
+          <a:prstGeom prst="rect">
             <a:avLst/>
           </a:prstGeom>
         </p:spPr>
@@ -8867,169 +8301,44 @@
             <a:schemeClr val="dk1"/>
           </a:fontRef>
         </p:style>
-      </p:cxnSp>
-      <p:sp>
-        <p:nvSpPr>
-          <p:cNvPr id="54" name="TextBox 53"/>
-          <p:cNvSpPr txBox="1"/>
-          <p:nvPr/>
-        </p:nvSpPr>
-        <p:spPr>
-          <a:xfrm>
-            <a:off x="642868" y="3054366"/>
-            <a:ext cx="398704" cy="369332"/>
-          </a:xfrm>
-          <a:prstGeom prst="rect">
-            <a:avLst/>
-          </a:prstGeom>
-          <a:noFill/>
-        </p:spPr>
-        <p:txBody>
-          <a:bodyPr wrap="none" rtlCol="0">
-            <a:spAutoFit/>
-          </a:bodyPr>
-          <a:lstStyle/>
-          <a:p>
+        <p:txBody>
+          <a:bodyPr rtlCol="0" anchor="ctr"/>
+          <a:lstStyle/>
+          <a:p>
+            <a:pPr algn="ctr"/>
             <a:r>
               <a:rPr lang="en-US" dirty="0" smtClean="0"/>
-              <a:t>L1</a:t>
-            </a:r>
-            <a:endParaRPr lang="en-US" dirty="0"/>
-          </a:p>
-        </p:txBody>
-      </p:sp>
-      <p:sp>
-        <p:nvSpPr>
-          <p:cNvPr id="55" name="TextBox 54"/>
-          <p:cNvSpPr txBox="1"/>
-          <p:nvPr/>
-        </p:nvSpPr>
-        <p:spPr>
-          <a:xfrm>
-            <a:off x="1539920" y="3131649"/>
-            <a:ext cx="398704" cy="369332"/>
-          </a:xfrm>
-          <a:prstGeom prst="rect">
-            <a:avLst/>
-          </a:prstGeom>
-          <a:noFill/>
-        </p:spPr>
-        <p:txBody>
-          <a:bodyPr wrap="none" rtlCol="0">
-            <a:spAutoFit/>
-          </a:bodyPr>
-          <a:lstStyle/>
-          <a:p>
+              <a:t>Local</a:t>
+            </a:r>
+          </a:p>
+          <a:p>
+            <a:pPr algn="ctr"/>
             <a:r>
               <a:rPr lang="en-US" dirty="0" smtClean="0"/>
-              <a:t>L1</a:t>
-            </a:r>
-            <a:endParaRPr lang="en-US" dirty="0"/>
-          </a:p>
-        </p:txBody>
-      </p:sp>
-      <p:sp>
-        <p:nvSpPr>
-          <p:cNvPr id="56" name="TextBox 55"/>
-          <p:cNvSpPr txBox="1"/>
-          <p:nvPr/>
-        </p:nvSpPr>
-        <p:spPr>
-          <a:xfrm>
-            <a:off x="2353573" y="3121193"/>
-            <a:ext cx="398704" cy="369332"/>
-          </a:xfrm>
-          <a:prstGeom prst="rect">
-            <a:avLst/>
-          </a:prstGeom>
-          <a:noFill/>
-        </p:spPr>
-        <p:txBody>
-          <a:bodyPr wrap="none" rtlCol="0">
-            <a:spAutoFit/>
-          </a:bodyPr>
-          <a:lstStyle/>
-          <a:p>
-            <a:r>
-              <a:rPr lang="en-US" dirty="0" smtClean="0"/>
-              <a:t>L1</a:t>
-            </a:r>
-            <a:endParaRPr lang="en-US" dirty="0"/>
-          </a:p>
-        </p:txBody>
-      </p:sp>
-      <p:sp>
-        <p:nvSpPr>
-          <p:cNvPr id="57" name="TextBox 56"/>
-          <p:cNvSpPr txBox="1"/>
-          <p:nvPr/>
-        </p:nvSpPr>
-        <p:spPr>
-          <a:xfrm>
-            <a:off x="1410518" y="2569093"/>
-            <a:ext cx="398704" cy="369332"/>
-          </a:xfrm>
-          <a:prstGeom prst="rect">
-            <a:avLst/>
-          </a:prstGeom>
-          <a:noFill/>
-        </p:spPr>
-        <p:txBody>
-          <a:bodyPr wrap="none" rtlCol="0">
-            <a:spAutoFit/>
-          </a:bodyPr>
-          <a:lstStyle/>
-          <a:p>
-            <a:r>
-              <a:rPr lang="en-US" dirty="0" smtClean="0"/>
-              <a:t>L2</a:t>
-            </a:r>
-            <a:endParaRPr lang="en-US" dirty="0"/>
-          </a:p>
-        </p:txBody>
-      </p:sp>
-      <p:sp>
-        <p:nvSpPr>
-          <p:cNvPr id="58" name="TextBox 57"/>
-          <p:cNvSpPr txBox="1"/>
-          <p:nvPr/>
-        </p:nvSpPr>
-        <p:spPr>
-          <a:xfrm>
-            <a:off x="831310" y="2466136"/>
-            <a:ext cx="398704" cy="369332"/>
-          </a:xfrm>
-          <a:prstGeom prst="rect">
-            <a:avLst/>
-          </a:prstGeom>
-          <a:noFill/>
-        </p:spPr>
-        <p:txBody>
-          <a:bodyPr wrap="none" rtlCol="0">
-            <a:spAutoFit/>
-          </a:bodyPr>
-          <a:lstStyle/>
-          <a:p>
-            <a:r>
-              <a:rPr lang="en-US" dirty="0" smtClean="0"/>
-              <a:t>L2</a:t>
-            </a:r>
-            <a:endParaRPr lang="en-US" dirty="0"/>
-          </a:p>
-        </p:txBody>
-      </p:sp>
-      <p:sp>
-        <p:nvSpPr>
-          <p:cNvPr id="59" name="Oval 58"/>
-          <p:cNvSpPr/>
-          <p:nvPr/>
-        </p:nvSpPr>
-        <p:spPr>
-          <a:xfrm>
-            <a:off x="2574639" y="2049995"/>
-            <a:ext cx="347411" cy="391244"/>
-          </a:xfrm>
-          <a:prstGeom prst="ellipse">
+              <a:t>Buffer</a:t>
+            </a:r>
+            <a:r>
+              <a:rPr lang="en-US" baseline="-25000" dirty="0" smtClean="0"/>
+              <a:t>1</a:t>
+            </a:r>
+            <a:endParaRPr lang="en-US" baseline="-25000" dirty="0"/>
+          </a:p>
+        </p:txBody>
+      </p:sp>
+      <p:cxnSp>
+        <p:nvCxnSpPr>
+          <p:cNvPr id="112" name="Straight Connector 111"/>
+          <p:cNvCxnSpPr>
+            <a:endCxn id="102" idx="0"/>
+          </p:cNvCxnSpPr>
+          <p:nvPr/>
+        </p:nvCxnSpPr>
+        <p:spPr>
+          <a:xfrm flipH="1">
+            <a:off x="4283962" y="1089616"/>
+            <a:ext cx="497872" cy="212135"/>
+          </a:xfrm>
+          <a:prstGeom prst="line">
             <a:avLst/>
           </a:prstGeom>
         </p:spPr>
@@ -9047,25 +8356,20 @@
             <a:schemeClr val="dk1"/>
           </a:fontRef>
         </p:style>
-        <p:txBody>
-          <a:bodyPr rtlCol="0" anchor="ctr"/>
-          <a:lstStyle/>
-          <a:p>
-            <a:pPr algn="ctr"/>
-            <a:endParaRPr lang="en-US"/>
-          </a:p>
-        </p:txBody>
-      </p:sp>
+      </p:cxnSp>
       <p:cxnSp>
         <p:nvCxnSpPr>
-          <p:cNvPr id="60" name="Straight Connector 59"/>
-          <p:cNvCxnSpPr/>
+          <p:cNvPr id="114" name="Straight Connector 113"/>
+          <p:cNvCxnSpPr>
+            <a:stCxn id="20" idx="2"/>
+            <a:endCxn id="122" idx="0"/>
+          </p:cNvCxnSpPr>
           <p:nvPr/>
         </p:nvCxnSpPr>
         <p:spPr>
-          <a:xfrm>
-            <a:off x="2700984" y="2441238"/>
-            <a:ext cx="221066" cy="401238"/>
+          <a:xfrm flipH="1">
+            <a:off x="5327027" y="1101998"/>
+            <a:ext cx="243108" cy="456360"/>
           </a:xfrm>
           <a:prstGeom prst="line">
             <a:avLst/>
@@ -9086,53 +8390,22 @@
           </a:fontRef>
         </p:style>
       </p:cxnSp>
-      <p:sp>
-        <p:nvSpPr>
-          <p:cNvPr id="63" name="TextBox 62"/>
-          <p:cNvSpPr txBox="1"/>
-          <p:nvPr/>
-        </p:nvSpPr>
-        <p:spPr>
-          <a:xfrm>
-            <a:off x="2785686" y="2842476"/>
-            <a:ext cx="344039" cy="369332"/>
-          </a:xfrm>
-          <a:prstGeom prst="rect">
-            <a:avLst/>
-          </a:prstGeom>
-          <a:noFill/>
-        </p:spPr>
-        <p:txBody>
-          <a:bodyPr wrap="none" rtlCol="0">
-            <a:spAutoFit/>
-          </a:bodyPr>
-          <a:lstStyle/>
-          <a:p>
-            <a:r>
-              <a:rPr lang="en-US" dirty="0" smtClean="0"/>
-              <a:t>…</a:t>
-            </a:r>
-            <a:endParaRPr lang="en-US" dirty="0"/>
-          </a:p>
-        </p:txBody>
-      </p:sp>
       <p:cxnSp>
         <p:nvCxnSpPr>
-          <p:cNvPr id="65" name="Straight Connector 64"/>
+          <p:cNvPr id="115" name="Straight Connector 114"/>
           <p:cNvCxnSpPr>
-            <a:stCxn id="59" idx="1"/>
+            <a:endCxn id="123" idx="0"/>
           </p:cNvCxnSpPr>
           <p:nvPr/>
         </p:nvCxnSpPr>
         <p:spPr>
-          <a:xfrm flipV="1">
-            <a:off x="2625516" y="1675109"/>
-            <a:ext cx="78539" cy="432182"/>
+          <a:xfrm>
+            <a:off x="6412611" y="1089616"/>
+            <a:ext cx="67326" cy="463240"/>
           </a:xfrm>
           <a:prstGeom prst="line">
             <a:avLst/>
           </a:prstGeom>
-          <a:ln/>
         </p:spPr>
         <p:style>
           <a:lnRef idx="2">
@@ -9149,90 +8422,932 @@
           </a:fontRef>
         </p:style>
       </p:cxnSp>
-      <p:sp>
-        <p:nvSpPr>
-          <p:cNvPr id="71" name="TextBox 70"/>
-          <p:cNvSpPr txBox="1"/>
-          <p:nvPr/>
-        </p:nvSpPr>
-        <p:spPr>
-          <a:xfrm>
-            <a:off x="1501842" y="2029961"/>
-            <a:ext cx="398704" cy="369332"/>
-          </a:xfrm>
-          <a:prstGeom prst="rect">
-            <a:avLst/>
-          </a:prstGeom>
-          <a:noFill/>
-        </p:spPr>
-        <p:txBody>
-          <a:bodyPr wrap="none" rtlCol="0">
-            <a:spAutoFit/>
-          </a:bodyPr>
-          <a:lstStyle/>
-          <a:p>
-            <a:r>
-              <a:rPr lang="en-US" dirty="0" smtClean="0"/>
-              <a:t>L3</a:t>
-            </a:r>
-            <a:endParaRPr lang="en-US" dirty="0"/>
-          </a:p>
-        </p:txBody>
-      </p:sp>
-      <p:sp>
-        <p:nvSpPr>
-          <p:cNvPr id="72" name="TextBox 71"/>
-          <p:cNvSpPr txBox="1"/>
-          <p:nvPr/>
-        </p:nvSpPr>
-        <p:spPr>
-          <a:xfrm>
-            <a:off x="2559002" y="2023361"/>
-            <a:ext cx="398704" cy="369332"/>
-          </a:xfrm>
-          <a:prstGeom prst="rect">
-            <a:avLst/>
-          </a:prstGeom>
-          <a:noFill/>
-        </p:spPr>
-        <p:txBody>
-          <a:bodyPr wrap="none" rtlCol="0">
-            <a:spAutoFit/>
-          </a:bodyPr>
-          <a:lstStyle/>
-          <a:p>
-            <a:r>
-              <a:rPr lang="en-US" dirty="0" smtClean="0"/>
-              <a:t>L3</a:t>
-            </a:r>
-            <a:endParaRPr lang="en-US" dirty="0"/>
-          </a:p>
-        </p:txBody>
-      </p:sp>
       <p:grpSp>
         <p:nvGrpSpPr>
-          <p:cNvPr id="91" name="Group 90"/>
+          <p:cNvPr id="3" name="Group 2"/>
           <p:cNvGrpSpPr/>
           <p:nvPr/>
         </p:nvGrpSpPr>
         <p:grpSpPr>
           <a:xfrm>
-            <a:off x="674913" y="3583473"/>
-            <a:ext cx="312793" cy="295086"/>
-            <a:chOff x="5878457" y="3175624"/>
-            <a:chExt cx="312793" cy="295086"/>
+            <a:off x="105115" y="1248836"/>
+            <a:ext cx="3251888" cy="3460747"/>
+            <a:chOff x="241768" y="1717820"/>
+            <a:chExt cx="3251888" cy="3460747"/>
           </a:xfrm>
         </p:grpSpPr>
         <p:sp>
           <p:nvSpPr>
-            <p:cNvPr id="88" name="Rectangle 87"/>
+            <p:cNvPr id="80" name="Oval 79"/>
             <p:cNvSpPr/>
             <p:nvPr/>
           </p:nvSpPr>
           <p:spPr>
             <a:xfrm>
-              <a:off x="5878457" y="3175624"/>
-              <a:ext cx="312793" cy="147543"/>
+              <a:off x="241768" y="1717820"/>
+              <a:ext cx="3251888" cy="3460747"/>
+            </a:xfrm>
+            <a:prstGeom prst="ellipse">
+              <a:avLst/>
+            </a:prstGeom>
+            <a:ln>
+              <a:prstDash val="lgDash"/>
+            </a:ln>
+          </p:spPr>
+          <p:style>
+            <a:lnRef idx="2">
+              <a:schemeClr val="dk1"/>
+            </a:lnRef>
+            <a:fillRef idx="1">
+              <a:schemeClr val="lt1"/>
+            </a:fillRef>
+            <a:effectRef idx="0">
+              <a:schemeClr val="dk1"/>
+            </a:effectRef>
+            <a:fontRef idx="minor">
+              <a:schemeClr val="dk1"/>
+            </a:fontRef>
+          </p:style>
+          <p:txBody>
+            <a:bodyPr rtlCol="0" anchor="ctr"/>
+            <a:lstStyle/>
+            <a:p>
+              <a:pPr algn="ctr"/>
+              <a:endParaRPr lang="en-US"/>
+            </a:p>
+          </p:txBody>
+        </p:sp>
+        <p:sp>
+          <p:nvSpPr>
+            <p:cNvPr id="4" name="Oval 3"/>
+            <p:cNvSpPr/>
+            <p:nvPr/>
+          </p:nvSpPr>
+          <p:spPr>
+            <a:xfrm>
+              <a:off x="1503435" y="3057758"/>
+              <a:ext cx="347411" cy="391244"/>
+            </a:xfrm>
+            <a:prstGeom prst="ellipse">
+              <a:avLst/>
+            </a:prstGeom>
+          </p:spPr>
+          <p:style>
+            <a:lnRef idx="2">
+              <a:schemeClr val="dk1"/>
+            </a:lnRef>
+            <a:fillRef idx="1">
+              <a:schemeClr val="lt1"/>
+            </a:fillRef>
+            <a:effectRef idx="0">
+              <a:schemeClr val="dk1"/>
+            </a:effectRef>
+            <a:fontRef idx="minor">
+              <a:schemeClr val="dk1"/>
+            </a:fontRef>
+          </p:style>
+          <p:txBody>
+            <a:bodyPr rtlCol="0" anchor="ctr"/>
+            <a:lstStyle/>
+            <a:p>
+              <a:pPr algn="ctr"/>
+              <a:endParaRPr lang="en-US"/>
+            </a:p>
+          </p:txBody>
+        </p:sp>
+        <p:sp>
+          <p:nvSpPr>
+            <p:cNvPr id="5" name="Oval 4"/>
+            <p:cNvSpPr/>
+            <p:nvPr/>
+          </p:nvSpPr>
+          <p:spPr>
+            <a:xfrm>
+              <a:off x="850035" y="3473900"/>
+              <a:ext cx="347411" cy="391244"/>
+            </a:xfrm>
+            <a:prstGeom prst="ellipse">
+              <a:avLst/>
+            </a:prstGeom>
+          </p:spPr>
+          <p:style>
+            <a:lnRef idx="2">
+              <a:schemeClr val="dk1"/>
+            </a:lnRef>
+            <a:fillRef idx="1">
+              <a:schemeClr val="lt1"/>
+            </a:fillRef>
+            <a:effectRef idx="0">
+              <a:schemeClr val="dk1"/>
+            </a:effectRef>
+            <a:fontRef idx="minor">
+              <a:schemeClr val="dk1"/>
+            </a:fontRef>
+          </p:style>
+          <p:txBody>
+            <a:bodyPr rtlCol="0" anchor="ctr"/>
+            <a:lstStyle/>
+            <a:p>
+              <a:pPr algn="ctr"/>
+              <a:endParaRPr lang="en-US"/>
+            </a:p>
+          </p:txBody>
+        </p:sp>
+        <p:sp>
+          <p:nvSpPr>
+            <p:cNvPr id="6" name="Oval 5"/>
+            <p:cNvSpPr/>
+            <p:nvPr/>
+          </p:nvSpPr>
+          <p:spPr>
+            <a:xfrm>
+              <a:off x="1436164" y="3576857"/>
+              <a:ext cx="347411" cy="391244"/>
+            </a:xfrm>
+            <a:prstGeom prst="ellipse">
+              <a:avLst/>
+            </a:prstGeom>
+          </p:spPr>
+          <p:style>
+            <a:lnRef idx="2">
+              <a:schemeClr val="dk1"/>
+            </a:lnRef>
+            <a:fillRef idx="1">
+              <a:schemeClr val="lt1"/>
+            </a:fillRef>
+            <a:effectRef idx="0">
+              <a:schemeClr val="dk1"/>
+            </a:effectRef>
+            <a:fontRef idx="minor">
+              <a:schemeClr val="dk1"/>
+            </a:fontRef>
+          </p:style>
+          <p:txBody>
+            <a:bodyPr rtlCol="0" anchor="ctr"/>
+            <a:lstStyle/>
+            <a:p>
+              <a:pPr algn="ctr"/>
+              <a:endParaRPr lang="en-US"/>
+            </a:p>
+          </p:txBody>
+        </p:sp>
+        <p:sp>
+          <p:nvSpPr>
+            <p:cNvPr id="7" name="Oval 6"/>
+            <p:cNvSpPr/>
+            <p:nvPr/>
+          </p:nvSpPr>
+          <p:spPr>
+            <a:xfrm>
+              <a:off x="2362827" y="4128957"/>
+              <a:ext cx="347411" cy="391244"/>
+            </a:xfrm>
+            <a:prstGeom prst="ellipse">
+              <a:avLst/>
+            </a:prstGeom>
+          </p:spPr>
+          <p:style>
+            <a:lnRef idx="2">
+              <a:schemeClr val="dk1"/>
+            </a:lnRef>
+            <a:fillRef idx="1">
+              <a:schemeClr val="lt1"/>
+            </a:fillRef>
+            <a:effectRef idx="0">
+              <a:schemeClr val="dk1"/>
+            </a:effectRef>
+            <a:fontRef idx="minor">
+              <a:schemeClr val="dk1"/>
+            </a:fontRef>
+          </p:style>
+          <p:txBody>
+            <a:bodyPr rtlCol="0" anchor="ctr"/>
+            <a:lstStyle/>
+            <a:p>
+              <a:pPr algn="ctr"/>
+              <a:endParaRPr lang="en-US"/>
+            </a:p>
+          </p:txBody>
+        </p:sp>
+        <p:cxnSp>
+          <p:nvCxnSpPr>
+            <p:cNvPr id="8" name="Straight Connector 7"/>
+            <p:cNvCxnSpPr>
+              <a:stCxn id="4" idx="3"/>
+              <a:endCxn id="5" idx="0"/>
+            </p:cNvCxnSpPr>
+            <p:nvPr/>
+          </p:nvCxnSpPr>
+          <p:spPr>
+            <a:xfrm flipH="1">
+              <a:off x="1023741" y="3391706"/>
+              <a:ext cx="530571" cy="82194"/>
+            </a:xfrm>
+            <a:prstGeom prst="line">
+              <a:avLst/>
+            </a:prstGeom>
+          </p:spPr>
+          <p:style>
+            <a:lnRef idx="2">
+              <a:schemeClr val="dk1"/>
+            </a:lnRef>
+            <a:fillRef idx="1">
+              <a:schemeClr val="lt1"/>
+            </a:fillRef>
+            <a:effectRef idx="0">
+              <a:schemeClr val="dk1"/>
+            </a:effectRef>
+            <a:fontRef idx="minor">
+              <a:schemeClr val="dk1"/>
+            </a:fontRef>
+          </p:style>
+        </p:cxnSp>
+        <p:cxnSp>
+          <p:nvCxnSpPr>
+            <p:cNvPr id="9" name="Straight Connector 8"/>
+            <p:cNvCxnSpPr>
+              <a:stCxn id="4" idx="4"/>
+              <a:endCxn id="6" idx="0"/>
+            </p:cNvCxnSpPr>
+            <p:nvPr/>
+          </p:nvCxnSpPr>
+          <p:spPr>
+            <a:xfrm flipH="1">
+              <a:off x="1609870" y="3449002"/>
+              <a:ext cx="67271" cy="127855"/>
+            </a:xfrm>
+            <a:prstGeom prst="line">
+              <a:avLst/>
+            </a:prstGeom>
+          </p:spPr>
+          <p:style>
+            <a:lnRef idx="2">
+              <a:schemeClr val="dk1"/>
+            </a:lnRef>
+            <a:fillRef idx="1">
+              <a:schemeClr val="lt1"/>
+            </a:fillRef>
+            <a:effectRef idx="0">
+              <a:schemeClr val="dk1"/>
+            </a:effectRef>
+            <a:fontRef idx="minor">
+              <a:schemeClr val="dk1"/>
+            </a:fontRef>
+          </p:style>
+        </p:cxnSp>
+        <p:cxnSp>
+          <p:nvCxnSpPr>
+            <p:cNvPr id="10" name="Straight Connector 9"/>
+            <p:cNvCxnSpPr>
+              <a:stCxn id="4" idx="5"/>
+              <a:endCxn id="7" idx="1"/>
+            </p:cNvCxnSpPr>
+            <p:nvPr/>
+          </p:nvCxnSpPr>
+          <p:spPr>
+            <a:xfrm>
+              <a:off x="1799969" y="3391706"/>
+              <a:ext cx="613735" cy="794547"/>
+            </a:xfrm>
+            <a:prstGeom prst="line">
+              <a:avLst/>
+            </a:prstGeom>
+          </p:spPr>
+          <p:style>
+            <a:lnRef idx="2">
+              <a:schemeClr val="dk1"/>
+            </a:lnRef>
+            <a:fillRef idx="1">
+              <a:schemeClr val="lt1"/>
+            </a:fillRef>
+            <a:effectRef idx="0">
+              <a:schemeClr val="dk1"/>
+            </a:effectRef>
+            <a:fontRef idx="minor">
+              <a:schemeClr val="dk1"/>
+            </a:fontRef>
+          </p:style>
+        </p:cxnSp>
+        <p:cxnSp>
+          <p:nvCxnSpPr>
+            <p:cNvPr id="12" name="Straight Connector 11"/>
+            <p:cNvCxnSpPr>
+              <a:stCxn id="5" idx="3"/>
+            </p:cNvCxnSpPr>
+            <p:nvPr/>
+          </p:nvCxnSpPr>
+          <p:spPr>
+            <a:xfrm flipH="1">
+              <a:off x="850035" y="3807848"/>
+              <a:ext cx="50877" cy="235100"/>
+            </a:xfrm>
+            <a:prstGeom prst="line">
+              <a:avLst/>
+            </a:prstGeom>
+          </p:spPr>
+          <p:style>
+            <a:lnRef idx="2">
+              <a:schemeClr val="dk1"/>
+            </a:lnRef>
+            <a:fillRef idx="1">
+              <a:schemeClr val="lt1"/>
+            </a:fillRef>
+            <a:effectRef idx="0">
+              <a:schemeClr val="dk1"/>
+            </a:effectRef>
+            <a:fontRef idx="minor">
+              <a:schemeClr val="dk1"/>
+            </a:fontRef>
+          </p:style>
+        </p:cxnSp>
+        <p:sp>
+          <p:nvSpPr>
+            <p:cNvPr id="13" name="Oval 12"/>
+            <p:cNvSpPr/>
+            <p:nvPr/>
+          </p:nvSpPr>
+          <p:spPr>
+            <a:xfrm>
+              <a:off x="676330" y="4039014"/>
+              <a:ext cx="347411" cy="391244"/>
+            </a:xfrm>
+            <a:prstGeom prst="ellipse">
+              <a:avLst/>
+            </a:prstGeom>
+          </p:spPr>
+          <p:style>
+            <a:lnRef idx="2">
+              <a:schemeClr val="dk1"/>
+            </a:lnRef>
+            <a:fillRef idx="1">
+              <a:schemeClr val="lt1"/>
+            </a:fillRef>
+            <a:effectRef idx="0">
+              <a:schemeClr val="dk1"/>
+            </a:effectRef>
+            <a:fontRef idx="minor">
+              <a:schemeClr val="dk1"/>
+            </a:fontRef>
+          </p:style>
+          <p:txBody>
+            <a:bodyPr rtlCol="0" anchor="ctr"/>
+            <a:lstStyle/>
+            <a:p>
+              <a:pPr algn="ctr"/>
+              <a:endParaRPr lang="en-US" sz="2000" dirty="0"/>
+            </a:p>
+          </p:txBody>
+        </p:sp>
+        <p:cxnSp>
+          <p:nvCxnSpPr>
+            <p:cNvPr id="14" name="Straight Connector 13"/>
+            <p:cNvCxnSpPr>
+              <a:stCxn id="6" idx="5"/>
+              <a:endCxn id="15" idx="0"/>
+            </p:cNvCxnSpPr>
+            <p:nvPr/>
+          </p:nvCxnSpPr>
+          <p:spPr>
+            <a:xfrm flipH="1">
+              <a:off x="1732697" y="3910805"/>
+              <a:ext cx="1" cy="218152"/>
+            </a:xfrm>
+            <a:prstGeom prst="line">
+              <a:avLst/>
+            </a:prstGeom>
+          </p:spPr>
+          <p:style>
+            <a:lnRef idx="2">
+              <a:schemeClr val="dk1"/>
+            </a:lnRef>
+            <a:fillRef idx="1">
+              <a:schemeClr val="lt1"/>
+            </a:fillRef>
+            <a:effectRef idx="0">
+              <a:schemeClr val="dk1"/>
+            </a:effectRef>
+            <a:fontRef idx="minor">
+              <a:schemeClr val="dk1"/>
+            </a:fontRef>
+          </p:style>
+        </p:cxnSp>
+        <p:sp>
+          <p:nvSpPr>
+            <p:cNvPr id="15" name="Oval 14"/>
+            <p:cNvSpPr/>
+            <p:nvPr/>
+          </p:nvSpPr>
+          <p:spPr>
+            <a:xfrm>
+              <a:off x="1558991" y="4128957"/>
+              <a:ext cx="347411" cy="391244"/>
+            </a:xfrm>
+            <a:prstGeom prst="ellipse">
+              <a:avLst/>
+            </a:prstGeom>
+          </p:spPr>
+          <p:style>
+            <a:lnRef idx="2">
+              <a:schemeClr val="dk1"/>
+            </a:lnRef>
+            <a:fillRef idx="1">
+              <a:schemeClr val="lt1"/>
+            </a:fillRef>
+            <a:effectRef idx="0">
+              <a:schemeClr val="dk1"/>
+            </a:effectRef>
+            <a:fontRef idx="minor">
+              <a:schemeClr val="dk1"/>
+            </a:fontRef>
+          </p:style>
+          <p:txBody>
+            <a:bodyPr rtlCol="0" anchor="ctr"/>
+            <a:lstStyle/>
+            <a:p>
+              <a:pPr algn="ctr"/>
+              <a:endParaRPr lang="en-US"/>
+            </a:p>
+          </p:txBody>
+        </p:sp>
+        <p:cxnSp>
+          <p:nvCxnSpPr>
+            <p:cNvPr id="21" name="Straight Connector 20"/>
+            <p:cNvCxnSpPr>
+              <a:stCxn id="4" idx="0"/>
+            </p:cNvCxnSpPr>
+            <p:nvPr/>
+          </p:nvCxnSpPr>
+          <p:spPr>
+            <a:xfrm flipH="1" flipV="1">
+              <a:off x="1433486" y="2483830"/>
+              <a:ext cx="243655" cy="573928"/>
+            </a:xfrm>
+            <a:prstGeom prst="line">
+              <a:avLst/>
+            </a:prstGeom>
+            <a:ln/>
+          </p:spPr>
+          <p:style>
+            <a:lnRef idx="2">
+              <a:schemeClr val="dk1"/>
+            </a:lnRef>
+            <a:fillRef idx="1">
+              <a:schemeClr val="lt1"/>
+            </a:fillRef>
+            <a:effectRef idx="0">
+              <a:schemeClr val="dk1"/>
+            </a:effectRef>
+            <a:fontRef idx="minor">
+              <a:schemeClr val="dk1"/>
+            </a:fontRef>
+          </p:style>
+        </p:cxnSp>
+        <p:cxnSp>
+          <p:nvCxnSpPr>
+            <p:cNvPr id="23" name="Straight Connector 22"/>
+            <p:cNvCxnSpPr/>
+            <p:nvPr/>
+          </p:nvCxnSpPr>
+          <p:spPr>
+            <a:xfrm flipV="1">
+              <a:off x="831637" y="4417245"/>
+              <a:ext cx="10256" cy="298006"/>
+            </a:xfrm>
+            <a:prstGeom prst="line">
+              <a:avLst/>
+            </a:prstGeom>
+            <a:ln/>
+          </p:spPr>
+          <p:style>
+            <a:lnRef idx="2">
+              <a:schemeClr val="dk1"/>
+            </a:lnRef>
+            <a:fillRef idx="1">
+              <a:schemeClr val="lt1"/>
+            </a:fillRef>
+            <a:effectRef idx="0">
+              <a:schemeClr val="dk1"/>
+            </a:effectRef>
+            <a:fontRef idx="minor">
+              <a:schemeClr val="dk1"/>
+            </a:fontRef>
+          </p:style>
+        </p:cxnSp>
+        <p:cxnSp>
+          <p:nvCxnSpPr>
+            <p:cNvPr id="24" name="Straight Connector 23"/>
+            <p:cNvCxnSpPr>
+              <a:endCxn id="15" idx="4"/>
+            </p:cNvCxnSpPr>
+            <p:nvPr/>
+          </p:nvCxnSpPr>
+          <p:spPr>
+            <a:xfrm flipH="1" flipV="1">
+              <a:off x="1732697" y="4520201"/>
+              <a:ext cx="1" cy="298006"/>
+            </a:xfrm>
+            <a:prstGeom prst="line">
+              <a:avLst/>
+            </a:prstGeom>
+            <a:ln/>
+          </p:spPr>
+          <p:style>
+            <a:lnRef idx="2">
+              <a:schemeClr val="dk1"/>
+            </a:lnRef>
+            <a:fillRef idx="1">
+              <a:schemeClr val="lt1"/>
+            </a:fillRef>
+            <a:effectRef idx="0">
+              <a:schemeClr val="dk1"/>
+            </a:effectRef>
+            <a:fontRef idx="minor">
+              <a:schemeClr val="dk1"/>
+            </a:fontRef>
+          </p:style>
+        </p:cxnSp>
+        <p:cxnSp>
+          <p:nvCxnSpPr>
+            <p:cNvPr id="48" name="Straight Connector 47"/>
+            <p:cNvCxnSpPr/>
+            <p:nvPr/>
+          </p:nvCxnSpPr>
+          <p:spPr>
+            <a:xfrm flipH="1" flipV="1">
+              <a:off x="2550581" y="4520201"/>
+              <a:ext cx="1" cy="298006"/>
+            </a:xfrm>
+            <a:prstGeom prst="line">
+              <a:avLst/>
+            </a:prstGeom>
+            <a:ln/>
+          </p:spPr>
+          <p:style>
+            <a:lnRef idx="2">
+              <a:schemeClr val="dk1"/>
+            </a:lnRef>
+            <a:fillRef idx="1">
+              <a:schemeClr val="lt1"/>
+            </a:fillRef>
+            <a:effectRef idx="0">
+              <a:schemeClr val="dk1"/>
+            </a:effectRef>
+            <a:fontRef idx="minor">
+              <a:schemeClr val="dk1"/>
+            </a:fontRef>
+          </p:style>
+        </p:cxnSp>
+        <p:sp>
+          <p:nvSpPr>
+            <p:cNvPr id="54" name="TextBox 53"/>
+            <p:cNvSpPr txBox="1"/>
+            <p:nvPr/>
+          </p:nvSpPr>
+          <p:spPr>
+            <a:xfrm>
+              <a:off x="642868" y="4062130"/>
+              <a:ext cx="398704" cy="369332"/>
+            </a:xfrm>
+            <a:prstGeom prst="rect">
+              <a:avLst/>
+            </a:prstGeom>
+            <a:noFill/>
+          </p:spPr>
+          <p:txBody>
+            <a:bodyPr wrap="none" rtlCol="0">
+              <a:spAutoFit/>
+            </a:bodyPr>
+            <a:lstStyle/>
+            <a:p>
+              <a:r>
+                <a:rPr lang="en-US" dirty="0" smtClean="0"/>
+                <a:t>L1</a:t>
+              </a:r>
+              <a:endParaRPr lang="en-US" dirty="0"/>
+            </a:p>
+          </p:txBody>
+        </p:sp>
+        <p:sp>
+          <p:nvSpPr>
+            <p:cNvPr id="55" name="TextBox 54"/>
+            <p:cNvSpPr txBox="1"/>
+            <p:nvPr/>
+          </p:nvSpPr>
+          <p:spPr>
+            <a:xfrm>
+              <a:off x="1539920" y="4139413"/>
+              <a:ext cx="398704" cy="369332"/>
+            </a:xfrm>
+            <a:prstGeom prst="rect">
+              <a:avLst/>
+            </a:prstGeom>
+            <a:noFill/>
+          </p:spPr>
+          <p:txBody>
+            <a:bodyPr wrap="none" rtlCol="0">
+              <a:spAutoFit/>
+            </a:bodyPr>
+            <a:lstStyle/>
+            <a:p>
+              <a:r>
+                <a:rPr lang="en-US" dirty="0" smtClean="0"/>
+                <a:t>L1</a:t>
+              </a:r>
+              <a:endParaRPr lang="en-US" dirty="0"/>
+            </a:p>
+          </p:txBody>
+        </p:sp>
+        <p:sp>
+          <p:nvSpPr>
+            <p:cNvPr id="56" name="TextBox 55"/>
+            <p:cNvSpPr txBox="1"/>
+            <p:nvPr/>
+          </p:nvSpPr>
+          <p:spPr>
+            <a:xfrm>
+              <a:off x="2353573" y="4128957"/>
+              <a:ext cx="398704" cy="369332"/>
+            </a:xfrm>
+            <a:prstGeom prst="rect">
+              <a:avLst/>
+            </a:prstGeom>
+            <a:noFill/>
+          </p:spPr>
+          <p:txBody>
+            <a:bodyPr wrap="none" rtlCol="0">
+              <a:spAutoFit/>
+            </a:bodyPr>
+            <a:lstStyle/>
+            <a:p>
+              <a:r>
+                <a:rPr lang="en-US" dirty="0" smtClean="0"/>
+                <a:t>L1</a:t>
+              </a:r>
+              <a:endParaRPr lang="en-US" dirty="0"/>
+            </a:p>
+          </p:txBody>
+        </p:sp>
+        <p:sp>
+          <p:nvSpPr>
+            <p:cNvPr id="57" name="TextBox 56"/>
+            <p:cNvSpPr txBox="1"/>
+            <p:nvPr/>
+          </p:nvSpPr>
+          <p:spPr>
+            <a:xfrm>
+              <a:off x="1410518" y="3576857"/>
+              <a:ext cx="398704" cy="369332"/>
+            </a:xfrm>
+            <a:prstGeom prst="rect">
+              <a:avLst/>
+            </a:prstGeom>
+            <a:noFill/>
+          </p:spPr>
+          <p:txBody>
+            <a:bodyPr wrap="none" rtlCol="0">
+              <a:spAutoFit/>
+            </a:bodyPr>
+            <a:lstStyle/>
+            <a:p>
+              <a:r>
+                <a:rPr lang="en-US" dirty="0" smtClean="0"/>
+                <a:t>L2</a:t>
+              </a:r>
+              <a:endParaRPr lang="en-US" dirty="0"/>
+            </a:p>
+          </p:txBody>
+        </p:sp>
+        <p:sp>
+          <p:nvSpPr>
+            <p:cNvPr id="58" name="TextBox 57"/>
+            <p:cNvSpPr txBox="1"/>
+            <p:nvPr/>
+          </p:nvSpPr>
+          <p:spPr>
+            <a:xfrm>
+              <a:off x="831310" y="3473900"/>
+              <a:ext cx="398704" cy="369332"/>
+            </a:xfrm>
+            <a:prstGeom prst="rect">
+              <a:avLst/>
+            </a:prstGeom>
+            <a:noFill/>
+          </p:spPr>
+          <p:txBody>
+            <a:bodyPr wrap="none" rtlCol="0">
+              <a:spAutoFit/>
+            </a:bodyPr>
+            <a:lstStyle/>
+            <a:p>
+              <a:r>
+                <a:rPr lang="en-US" dirty="0" smtClean="0"/>
+                <a:t>L2</a:t>
+              </a:r>
+              <a:endParaRPr lang="en-US" dirty="0"/>
+            </a:p>
+          </p:txBody>
+        </p:sp>
+        <p:sp>
+          <p:nvSpPr>
+            <p:cNvPr id="59" name="Oval 58"/>
+            <p:cNvSpPr/>
+            <p:nvPr/>
+          </p:nvSpPr>
+          <p:spPr>
+            <a:xfrm>
+              <a:off x="2574639" y="3057759"/>
+              <a:ext cx="347411" cy="391244"/>
+            </a:xfrm>
+            <a:prstGeom prst="ellipse">
+              <a:avLst/>
+            </a:prstGeom>
+          </p:spPr>
+          <p:style>
+            <a:lnRef idx="2">
+              <a:schemeClr val="dk1"/>
+            </a:lnRef>
+            <a:fillRef idx="1">
+              <a:schemeClr val="lt1"/>
+            </a:fillRef>
+            <a:effectRef idx="0">
+              <a:schemeClr val="dk1"/>
+            </a:effectRef>
+            <a:fontRef idx="minor">
+              <a:schemeClr val="dk1"/>
+            </a:fontRef>
+          </p:style>
+          <p:txBody>
+            <a:bodyPr rtlCol="0" anchor="ctr"/>
+            <a:lstStyle/>
+            <a:p>
+              <a:pPr algn="ctr"/>
+              <a:endParaRPr lang="en-US"/>
+            </a:p>
+          </p:txBody>
+        </p:sp>
+        <p:cxnSp>
+          <p:nvCxnSpPr>
+            <p:cNvPr id="60" name="Straight Connector 59"/>
+            <p:cNvCxnSpPr/>
+            <p:nvPr/>
+          </p:nvCxnSpPr>
+          <p:spPr>
+            <a:xfrm>
+              <a:off x="2700984" y="3449002"/>
+              <a:ext cx="221066" cy="401238"/>
+            </a:xfrm>
+            <a:prstGeom prst="line">
+              <a:avLst/>
+            </a:prstGeom>
+          </p:spPr>
+          <p:style>
+            <a:lnRef idx="2">
+              <a:schemeClr val="dk1"/>
+            </a:lnRef>
+            <a:fillRef idx="1">
+              <a:schemeClr val="lt1"/>
+            </a:fillRef>
+            <a:effectRef idx="0">
+              <a:schemeClr val="dk1"/>
+            </a:effectRef>
+            <a:fontRef idx="minor">
+              <a:schemeClr val="dk1"/>
+            </a:fontRef>
+          </p:style>
+        </p:cxnSp>
+        <p:sp>
+          <p:nvSpPr>
+            <p:cNvPr id="63" name="TextBox 62"/>
+            <p:cNvSpPr txBox="1"/>
+            <p:nvPr/>
+          </p:nvSpPr>
+          <p:spPr>
+            <a:xfrm>
+              <a:off x="2785686" y="3850240"/>
+              <a:ext cx="344039" cy="369332"/>
+            </a:xfrm>
+            <a:prstGeom prst="rect">
+              <a:avLst/>
+            </a:prstGeom>
+            <a:noFill/>
+          </p:spPr>
+          <p:txBody>
+            <a:bodyPr wrap="none" rtlCol="0">
+              <a:spAutoFit/>
+            </a:bodyPr>
+            <a:lstStyle/>
+            <a:p>
+              <a:r>
+                <a:rPr lang="en-US" dirty="0" smtClean="0"/>
+                <a:t>…</a:t>
+              </a:r>
+              <a:endParaRPr lang="en-US" dirty="0"/>
+            </a:p>
+          </p:txBody>
+        </p:sp>
+        <p:cxnSp>
+          <p:nvCxnSpPr>
+            <p:cNvPr id="65" name="Straight Connector 64"/>
+            <p:cNvCxnSpPr>
+              <a:stCxn id="59" idx="1"/>
+            </p:cNvCxnSpPr>
+            <p:nvPr/>
+          </p:nvCxnSpPr>
+          <p:spPr>
+            <a:xfrm flipV="1">
+              <a:off x="2625516" y="2682873"/>
+              <a:ext cx="78539" cy="432182"/>
+            </a:xfrm>
+            <a:prstGeom prst="line">
+              <a:avLst/>
+            </a:prstGeom>
+            <a:ln/>
+          </p:spPr>
+          <p:style>
+            <a:lnRef idx="2">
+              <a:schemeClr val="dk1"/>
+            </a:lnRef>
+            <a:fillRef idx="1">
+              <a:schemeClr val="lt1"/>
+            </a:fillRef>
+            <a:effectRef idx="0">
+              <a:schemeClr val="dk1"/>
+            </a:effectRef>
+            <a:fontRef idx="minor">
+              <a:schemeClr val="dk1"/>
+            </a:fontRef>
+          </p:style>
+        </p:cxnSp>
+        <p:sp>
+          <p:nvSpPr>
+            <p:cNvPr id="71" name="TextBox 70"/>
+            <p:cNvSpPr txBox="1"/>
+            <p:nvPr/>
+          </p:nvSpPr>
+          <p:spPr>
+            <a:xfrm>
+              <a:off x="1501842" y="3037725"/>
+              <a:ext cx="398704" cy="369332"/>
+            </a:xfrm>
+            <a:prstGeom prst="rect">
+              <a:avLst/>
+            </a:prstGeom>
+            <a:noFill/>
+          </p:spPr>
+          <p:txBody>
+            <a:bodyPr wrap="none" rtlCol="0">
+              <a:spAutoFit/>
+            </a:bodyPr>
+            <a:lstStyle/>
+            <a:p>
+              <a:r>
+                <a:rPr lang="en-US" dirty="0" smtClean="0"/>
+                <a:t>L3</a:t>
+              </a:r>
+              <a:endParaRPr lang="en-US" dirty="0"/>
+            </a:p>
+          </p:txBody>
+        </p:sp>
+        <p:sp>
+          <p:nvSpPr>
+            <p:cNvPr id="72" name="TextBox 71"/>
+            <p:cNvSpPr txBox="1"/>
+            <p:nvPr/>
+          </p:nvSpPr>
+          <p:spPr>
+            <a:xfrm>
+              <a:off x="2559002" y="3031125"/>
+              <a:ext cx="398704" cy="369332"/>
+            </a:xfrm>
+            <a:prstGeom prst="rect">
+              <a:avLst/>
+            </a:prstGeom>
+            <a:noFill/>
+          </p:spPr>
+          <p:txBody>
+            <a:bodyPr wrap="none" rtlCol="0">
+              <a:spAutoFit/>
+            </a:bodyPr>
+            <a:lstStyle/>
+            <a:p>
+              <a:r>
+                <a:rPr lang="en-US" dirty="0" smtClean="0"/>
+                <a:t>L3</a:t>
+              </a:r>
+              <a:endParaRPr lang="en-US" dirty="0"/>
+            </a:p>
+          </p:txBody>
+        </p:sp>
+        <p:sp>
+          <p:nvSpPr>
+            <p:cNvPr id="76" name="Rectangle 75"/>
+            <p:cNvSpPr/>
+            <p:nvPr/>
+          </p:nvSpPr>
+          <p:spPr>
+            <a:xfrm>
+              <a:off x="1329730" y="2254934"/>
+              <a:ext cx="1592320" cy="648894"/>
             </a:xfrm>
             <a:prstGeom prst="rect">
               <a:avLst/>
@@ -9257,20 +9372,80 @@
             <a:lstStyle/>
             <a:p>
               <a:pPr algn="ctr"/>
-              <a:endParaRPr lang="en-US" dirty="0"/>
+              <a:r>
+                <a:rPr lang="en-US" dirty="0" smtClean="0"/>
+                <a:t>Main memory</a:t>
+              </a:r>
+              <a:endParaRPr lang="en-US" baseline="-25000" dirty="0"/>
+            </a:p>
+          </p:txBody>
+        </p:sp>
+      </p:grpSp>
+      <p:grpSp>
+        <p:nvGrpSpPr>
+          <p:cNvPr id="18" name="Group 17"/>
+          <p:cNvGrpSpPr/>
+          <p:nvPr/>
+        </p:nvGrpSpPr>
+        <p:grpSpPr>
+          <a:xfrm>
+            <a:off x="3716227" y="2646071"/>
+            <a:ext cx="2843061" cy="2894176"/>
+            <a:chOff x="3899118" y="3552665"/>
+            <a:chExt cx="2843061" cy="2894176"/>
+          </a:xfrm>
+        </p:grpSpPr>
+        <p:sp>
+          <p:nvSpPr>
+            <p:cNvPr id="113" name="Oval 112"/>
+            <p:cNvSpPr/>
+            <p:nvPr/>
+          </p:nvSpPr>
+          <p:spPr>
+            <a:xfrm>
+              <a:off x="3899118" y="3552665"/>
+              <a:ext cx="2843061" cy="2894176"/>
+            </a:xfrm>
+            <a:prstGeom prst="ellipse">
+              <a:avLst/>
+            </a:prstGeom>
+            <a:ln>
+              <a:prstDash val="sysDash"/>
+            </a:ln>
+          </p:spPr>
+          <p:style>
+            <a:lnRef idx="2">
+              <a:schemeClr val="dk1"/>
+            </a:lnRef>
+            <a:fillRef idx="1">
+              <a:schemeClr val="lt1"/>
+            </a:fillRef>
+            <a:effectRef idx="0">
+              <a:schemeClr val="dk1"/>
+            </a:effectRef>
+            <a:fontRef idx="minor">
+              <a:schemeClr val="dk1"/>
+            </a:fontRef>
+          </p:style>
+          <p:txBody>
+            <a:bodyPr rtlCol="0" anchor="ctr"/>
+            <a:lstStyle/>
+            <a:p>
+              <a:pPr algn="ctr"/>
+              <a:endParaRPr lang="en-US"/>
             </a:p>
           </p:txBody>
         </p:sp>
         <p:sp>
           <p:nvSpPr>
-            <p:cNvPr id="90" name="Rectangle 89"/>
+            <p:cNvPr id="62" name="Rectangle 61"/>
             <p:cNvSpPr/>
             <p:nvPr/>
           </p:nvSpPr>
           <p:spPr>
             <a:xfrm>
-              <a:off x="5878457" y="3323167"/>
-              <a:ext cx="312793" cy="147543"/>
+              <a:off x="4488674" y="4118757"/>
+              <a:ext cx="586320" cy="877895"/>
             </a:xfrm>
             <a:prstGeom prst="rect">
               <a:avLst/>
@@ -9295,35 +9470,24 @@
             <a:lstStyle/>
             <a:p>
               <a:pPr algn="ctr"/>
-              <a:endParaRPr lang="en-US" dirty="0"/>
+              <a:r>
+                <a:rPr lang="en-US" dirty="0" smtClean="0"/>
+                <a:t>ROB</a:t>
+              </a:r>
+              <a:endParaRPr lang="en-US" baseline="-25000" dirty="0"/>
             </a:p>
           </p:txBody>
         </p:sp>
-      </p:grpSp>
-      <p:grpSp>
-        <p:nvGrpSpPr>
-          <p:cNvPr id="92" name="Group 91"/>
-          <p:cNvGrpSpPr/>
-          <p:nvPr/>
-        </p:nvGrpSpPr>
-        <p:grpSpPr>
-          <a:xfrm>
-            <a:off x="1576301" y="3676470"/>
-            <a:ext cx="312793" cy="295086"/>
-            <a:chOff x="5878457" y="3175624"/>
-            <a:chExt cx="312793" cy="295086"/>
-          </a:xfrm>
-        </p:grpSpPr>
         <p:sp>
           <p:nvSpPr>
-            <p:cNvPr id="93" name="Rectangle 92"/>
+            <p:cNvPr id="64" name="Rectangle 63"/>
             <p:cNvSpPr/>
             <p:nvPr/>
           </p:nvSpPr>
           <p:spPr>
             <a:xfrm>
-              <a:off x="5878457" y="3175624"/>
-              <a:ext cx="312793" cy="147543"/>
+              <a:off x="5414526" y="4813230"/>
+              <a:ext cx="888049" cy="311433"/>
             </a:xfrm>
             <a:prstGeom prst="rect">
               <a:avLst/>
@@ -9348,20 +9512,24 @@
             <a:lstStyle/>
             <a:p>
               <a:pPr algn="ctr"/>
-              <a:endParaRPr lang="en-US" dirty="0"/>
+              <a:r>
+                <a:rPr lang="en-US" dirty="0" smtClean="0"/>
+                <a:t>PC</a:t>
+              </a:r>
+              <a:endParaRPr lang="en-US" baseline="-25000" dirty="0"/>
             </a:p>
           </p:txBody>
         </p:sp>
         <p:sp>
           <p:nvSpPr>
-            <p:cNvPr id="94" name="Rectangle 93"/>
+            <p:cNvPr id="67" name="Rectangle 66"/>
             <p:cNvSpPr/>
             <p:nvPr/>
           </p:nvSpPr>
           <p:spPr>
             <a:xfrm>
-              <a:off x="5878457" y="3323167"/>
-              <a:ext cx="312793" cy="147543"/>
+              <a:off x="5414527" y="4239091"/>
+              <a:ext cx="888049" cy="576104"/>
             </a:xfrm>
             <a:prstGeom prst="rect">
               <a:avLst/>
@@ -9386,35 +9554,328 @@
             <a:lstStyle/>
             <a:p>
               <a:pPr algn="ctr"/>
+              <a:r>
+                <a:rPr lang="en-US" dirty="0" err="1" smtClean="0"/>
+                <a:t>RegFile</a:t>
+              </a:r>
               <a:endParaRPr lang="en-US" dirty="0"/>
+            </a:p>
+            <a:p>
+              <a:pPr algn="ctr"/>
+              <a:r>
+                <a:rPr lang="en-US" dirty="0" smtClean="0"/>
+                <a:t>State</a:t>
+              </a:r>
+              <a:endParaRPr lang="en-US" i="1" dirty="0" smtClean="0"/>
             </a:p>
           </p:txBody>
         </p:sp>
-      </p:grpSp>
-      <p:grpSp>
-        <p:nvGrpSpPr>
-          <p:cNvPr id="95" name="Group 94"/>
-          <p:cNvGrpSpPr/>
-          <p:nvPr/>
-        </p:nvGrpSpPr>
-        <p:grpSpPr>
-          <a:xfrm>
-            <a:off x="2400989" y="3670121"/>
-            <a:ext cx="312793" cy="295086"/>
-            <a:chOff x="5878457" y="3175624"/>
-            <a:chExt cx="312793" cy="295086"/>
-          </a:xfrm>
-        </p:grpSpPr>
         <p:sp>
           <p:nvSpPr>
-            <p:cNvPr id="96" name="Rectangle 95"/>
+            <p:cNvPr id="74" name="Freeform 73"/>
+            <p:cNvSpPr/>
+            <p:nvPr/>
+          </p:nvSpPr>
+          <p:spPr>
+            <a:xfrm flipH="1" flipV="1">
+              <a:off x="5480331" y="5138911"/>
+              <a:ext cx="397933" cy="242443"/>
+            </a:xfrm>
+            <a:custGeom>
+              <a:avLst/>
+              <a:gdLst>
+                <a:gd name="connsiteX0" fmla="*/ 0 w 0"/>
+                <a:gd name="connsiteY0" fmla="*/ 455083 h 455083"/>
+                <a:gd name="connsiteX1" fmla="*/ 0 w 0"/>
+                <a:gd name="connsiteY1" fmla="*/ 0 h 455083"/>
+              </a:gdLst>
+              <a:ahLst/>
+              <a:cxnLst>
+                <a:cxn ang="0">
+                  <a:pos x="connsiteX0" y="connsiteY0"/>
+                </a:cxn>
+                <a:cxn ang="0">
+                  <a:pos x="connsiteX1" y="connsiteY1"/>
+                </a:cxn>
+              </a:cxnLst>
+              <a:rect l="l" t="t" r="r" b="b"/>
+              <a:pathLst>
+                <a:path h="455083">
+                  <a:moveTo>
+                    <a:pt x="0" y="455083"/>
+                  </a:moveTo>
+                  <a:lnTo>
+                    <a:pt x="0" y="0"/>
+                  </a:lnTo>
+                </a:path>
+              </a:pathLst>
+            </a:custGeom>
+            <a:ln>
+              <a:solidFill>
+                <a:schemeClr val="tx1"/>
+              </a:solidFill>
+              <a:headEnd type="none"/>
+              <a:tailEnd type="triangle"/>
+            </a:ln>
+            <a:effectLst/>
+          </p:spPr>
+          <p:style>
+            <a:lnRef idx="2">
+              <a:schemeClr val="accent1"/>
+            </a:lnRef>
+            <a:fillRef idx="0">
+              <a:schemeClr val="accent1"/>
+            </a:fillRef>
+            <a:effectRef idx="1">
+              <a:schemeClr val="accent1"/>
+            </a:effectRef>
+            <a:fontRef idx="minor">
+              <a:schemeClr val="tx1"/>
+            </a:fontRef>
+          </p:style>
+          <p:txBody>
+            <a:bodyPr rtlCol="0" anchor="ctr"/>
+            <a:lstStyle/>
+            <a:p>
+              <a:pPr algn="ctr"/>
+              <a:endParaRPr lang="en-US"/>
+            </a:p>
+          </p:txBody>
+        </p:sp>
+        <p:cxnSp>
+          <p:nvCxnSpPr>
+            <p:cNvPr id="75" name="Straight Connector 74"/>
+            <p:cNvCxnSpPr/>
+            <p:nvPr/>
+          </p:nvCxnSpPr>
+          <p:spPr>
+            <a:xfrm flipV="1">
+              <a:off x="4781834" y="3738207"/>
+              <a:ext cx="0" cy="380550"/>
+            </a:xfrm>
+            <a:prstGeom prst="line">
+              <a:avLst/>
+            </a:prstGeom>
+          </p:spPr>
+          <p:style>
+            <a:lnRef idx="2">
+              <a:schemeClr val="dk1"/>
+            </a:lnRef>
+            <a:fillRef idx="1">
+              <a:schemeClr val="lt1"/>
+            </a:fillRef>
+            <a:effectRef idx="0">
+              <a:schemeClr val="dk1"/>
+            </a:effectRef>
+            <a:fontRef idx="minor">
+              <a:schemeClr val="dk1"/>
+            </a:fontRef>
+          </p:style>
+        </p:cxnSp>
+        <p:sp>
+          <p:nvSpPr>
+            <p:cNvPr id="89" name="Oval 88"/>
             <p:cNvSpPr/>
             <p:nvPr/>
           </p:nvSpPr>
           <p:spPr>
             <a:xfrm>
-              <a:off x="5878457" y="3175624"/>
-              <a:ext cx="312793" cy="147543"/>
+              <a:off x="4146163" y="5316003"/>
+              <a:ext cx="1058332" cy="635000"/>
+            </a:xfrm>
+            <a:prstGeom prst="ellipse">
+              <a:avLst/>
+            </a:prstGeom>
+          </p:spPr>
+          <p:style>
+            <a:lnRef idx="2">
+              <a:schemeClr val="dk1"/>
+            </a:lnRef>
+            <a:fillRef idx="1">
+              <a:schemeClr val="lt1"/>
+            </a:fillRef>
+            <a:effectRef idx="0">
+              <a:schemeClr val="dk1"/>
+            </a:effectRef>
+            <a:fontRef idx="minor">
+              <a:schemeClr val="dk1"/>
+            </a:fontRef>
+          </p:style>
+          <p:txBody>
+            <a:bodyPr rtlCol="0" anchor="ctr"/>
+            <a:lstStyle/>
+            <a:p>
+              <a:pPr algn="ctr"/>
+              <a:r>
+                <a:rPr lang="en-US" dirty="0" smtClean="0"/>
+                <a:t>Fetch</a:t>
+              </a:r>
+              <a:endParaRPr lang="en-US" dirty="0"/>
+            </a:p>
+          </p:txBody>
+        </p:sp>
+        <p:sp>
+          <p:nvSpPr>
+            <p:cNvPr id="99" name="Freeform 98"/>
+            <p:cNvSpPr/>
+            <p:nvPr/>
+          </p:nvSpPr>
+          <p:spPr>
+            <a:xfrm flipV="1">
+              <a:off x="5057976" y="4511986"/>
+              <a:ext cx="352189" cy="45719"/>
+            </a:xfrm>
+            <a:custGeom>
+              <a:avLst/>
+              <a:gdLst>
+                <a:gd name="connsiteX0" fmla="*/ 0 w 391584"/>
+                <a:gd name="connsiteY0" fmla="*/ 0 h 0"/>
+                <a:gd name="connsiteX1" fmla="*/ 391584 w 391584"/>
+                <a:gd name="connsiteY1" fmla="*/ 0 h 0"/>
+              </a:gdLst>
+              <a:ahLst/>
+              <a:cxnLst>
+                <a:cxn ang="0">
+                  <a:pos x="connsiteX0" y="connsiteY0"/>
+                </a:cxn>
+                <a:cxn ang="0">
+                  <a:pos x="connsiteX1" y="connsiteY1"/>
+                </a:cxn>
+              </a:cxnLst>
+              <a:rect l="l" t="t" r="r" b="b"/>
+              <a:pathLst>
+                <a:path w="391584">
+                  <a:moveTo>
+                    <a:pt x="0" y="0"/>
+                  </a:moveTo>
+                  <a:lnTo>
+                    <a:pt x="391584" y="0"/>
+                  </a:lnTo>
+                </a:path>
+              </a:pathLst>
+            </a:custGeom>
+            <a:ln>
+              <a:solidFill>
+                <a:schemeClr val="tx1"/>
+              </a:solidFill>
+              <a:headEnd type="none"/>
+              <a:tailEnd type="triangle"/>
+            </a:ln>
+            <a:effectLst/>
+          </p:spPr>
+          <p:style>
+            <a:lnRef idx="2">
+              <a:schemeClr val="accent1"/>
+            </a:lnRef>
+            <a:fillRef idx="0">
+              <a:schemeClr val="accent1"/>
+            </a:fillRef>
+            <a:effectRef idx="1">
+              <a:schemeClr val="accent1"/>
+            </a:effectRef>
+            <a:fontRef idx="minor">
+              <a:schemeClr val="tx1"/>
+            </a:fontRef>
+          </p:style>
+          <p:txBody>
+            <a:bodyPr rtlCol="0" anchor="ctr"/>
+            <a:lstStyle/>
+            <a:p>
+              <a:pPr algn="ctr"/>
+              <a:endParaRPr lang="en-US"/>
+            </a:p>
+          </p:txBody>
+        </p:sp>
+        <p:sp>
+          <p:nvSpPr>
+            <p:cNvPr id="38" name="Freeform 37"/>
+            <p:cNvSpPr/>
+            <p:nvPr/>
+          </p:nvSpPr>
+          <p:spPr>
+            <a:xfrm>
+              <a:off x="5204495" y="4557705"/>
+              <a:ext cx="211667" cy="418052"/>
+            </a:xfrm>
+            <a:custGeom>
+              <a:avLst/>
+              <a:gdLst>
+                <a:gd name="connsiteX0" fmla="*/ 0 w 211667"/>
+                <a:gd name="connsiteY0" fmla="*/ 0 h 433917"/>
+                <a:gd name="connsiteX1" fmla="*/ 0 w 211667"/>
+                <a:gd name="connsiteY1" fmla="*/ 433917 h 433917"/>
+                <a:gd name="connsiteX2" fmla="*/ 211667 w 211667"/>
+                <a:gd name="connsiteY2" fmla="*/ 433917 h 433917"/>
+              </a:gdLst>
+              <a:ahLst/>
+              <a:cxnLst>
+                <a:cxn ang="0">
+                  <a:pos x="connsiteX0" y="connsiteY0"/>
+                </a:cxn>
+                <a:cxn ang="0">
+                  <a:pos x="connsiteX1" y="connsiteY1"/>
+                </a:cxn>
+                <a:cxn ang="0">
+                  <a:pos x="connsiteX2" y="connsiteY2"/>
+                </a:cxn>
+              </a:cxnLst>
+              <a:rect l="l" t="t" r="r" b="b"/>
+              <a:pathLst>
+                <a:path w="211667" h="433917">
+                  <a:moveTo>
+                    <a:pt x="0" y="0"/>
+                  </a:moveTo>
+                  <a:lnTo>
+                    <a:pt x="0" y="433917"/>
+                  </a:lnTo>
+                  <a:lnTo>
+                    <a:pt x="211667" y="433917"/>
+                  </a:lnTo>
+                </a:path>
+              </a:pathLst>
+            </a:custGeom>
+            <a:ln>
+              <a:solidFill>
+                <a:schemeClr val="tx1"/>
+              </a:solidFill>
+              <a:headEnd type="oval"/>
+              <a:tailEnd type="triangle"/>
+            </a:ln>
+            <a:effectLst/>
+          </p:spPr>
+          <p:style>
+            <a:lnRef idx="2">
+              <a:schemeClr val="accent1"/>
+            </a:lnRef>
+            <a:fillRef idx="0">
+              <a:schemeClr val="accent1"/>
+            </a:fillRef>
+            <a:effectRef idx="1">
+              <a:schemeClr val="accent1"/>
+            </a:effectRef>
+            <a:fontRef idx="minor">
+              <a:schemeClr val="tx1"/>
+            </a:fontRef>
+          </p:style>
+          <p:txBody>
+            <a:bodyPr rtlCol="0" anchor="ctr"/>
+            <a:lstStyle/>
+            <a:p>
+              <a:pPr algn="ctr"/>
+              <a:endParaRPr lang="en-US"/>
+            </a:p>
+          </p:txBody>
+        </p:sp>
+        <p:sp>
+          <p:nvSpPr>
+            <p:cNvPr id="100" name="Rectangle 99"/>
+            <p:cNvSpPr/>
+            <p:nvPr/>
+          </p:nvSpPr>
+          <p:spPr>
+            <a:xfrm>
+              <a:off x="5379155" y="5379052"/>
+              <a:ext cx="923421" cy="571951"/>
             </a:xfrm>
             <a:prstGeom prst="rect">
               <a:avLst/>
@@ -9439,37 +9900,82 @@
             <a:lstStyle/>
             <a:p>
               <a:pPr algn="ctr"/>
+              <a:r>
+                <a:rPr lang="en-US" dirty="0" smtClean="0"/>
+                <a:t>Branch</a:t>
+              </a:r>
+            </a:p>
+            <a:p>
+              <a:pPr algn="ctr"/>
+              <a:r>
+                <a:rPr lang="en-US" dirty="0" err="1" smtClean="0"/>
+                <a:t>Pred</a:t>
+              </a:r>
               <a:endParaRPr lang="en-US" dirty="0"/>
             </a:p>
           </p:txBody>
         </p:sp>
         <p:sp>
           <p:nvSpPr>
-            <p:cNvPr id="97" name="Rectangle 96"/>
+            <p:cNvPr id="104" name="Freeform 103"/>
             <p:cNvSpPr/>
             <p:nvPr/>
           </p:nvSpPr>
           <p:spPr>
-            <a:xfrm>
-              <a:off x="5878457" y="3323167"/>
-              <a:ext cx="312793" cy="147543"/>
+            <a:xfrm flipH="1">
+              <a:off x="4345127" y="4975757"/>
+              <a:ext cx="397933" cy="340246"/>
             </a:xfrm>
-            <a:prstGeom prst="rect">
+            <a:custGeom>
               <a:avLst/>
-            </a:prstGeom>
+              <a:gdLst>
+                <a:gd name="connsiteX0" fmla="*/ 0 w 0"/>
+                <a:gd name="connsiteY0" fmla="*/ 455083 h 455083"/>
+                <a:gd name="connsiteX1" fmla="*/ 0 w 0"/>
+                <a:gd name="connsiteY1" fmla="*/ 0 h 455083"/>
+              </a:gdLst>
+              <a:ahLst/>
+              <a:cxnLst>
+                <a:cxn ang="0">
+                  <a:pos x="connsiteX0" y="connsiteY0"/>
+                </a:cxn>
+                <a:cxn ang="0">
+                  <a:pos x="connsiteX1" y="connsiteY1"/>
+                </a:cxn>
+              </a:cxnLst>
+              <a:rect l="l" t="t" r="r" b="b"/>
+              <a:pathLst>
+                <a:path h="455083">
+                  <a:moveTo>
+                    <a:pt x="0" y="455083"/>
+                  </a:moveTo>
+                  <a:lnTo>
+                    <a:pt x="0" y="0"/>
+                  </a:lnTo>
+                </a:path>
+              </a:pathLst>
+            </a:custGeom>
+            <a:ln>
+              <a:solidFill>
+                <a:schemeClr val="tx1"/>
+              </a:solidFill>
+              <a:headEnd type="none"/>
+              <a:tailEnd type="triangle"/>
+            </a:ln>
+            <a:effectLst/>
           </p:spPr>
           <p:style>
             <a:lnRef idx="2">
-              <a:schemeClr val="dk1"/>
+              <a:schemeClr val="accent1"/>
             </a:lnRef>
-            <a:fillRef idx="1">
-              <a:schemeClr val="lt1"/>
+            <a:fillRef idx="0">
+              <a:schemeClr val="accent1"/>
             </a:fillRef>
-            <a:effectRef idx="0">
-              <a:schemeClr val="dk1"/>
+            <a:effectRef idx="1">
+              <a:schemeClr val="accent1"/>
             </a:effectRef>
             <a:fontRef idx="minor">
-              <a:schemeClr val="dk1"/>
+              <a:schemeClr val="tx1"/>
             </a:fontRef>
           </p:style>
           <p:txBody>
@@ -9477,52 +9983,71 @@
             <a:lstStyle/>
             <a:p>
               <a:pPr algn="ctr"/>
-              <a:endParaRPr lang="en-US" dirty="0"/>
+              <a:endParaRPr lang="en-US"/>
             </a:p>
           </p:txBody>
         </p:sp>
-      </p:grpSp>
-      <p:grpSp>
-        <p:nvGrpSpPr>
-          <p:cNvPr id="101" name="Group 100"/>
-          <p:cNvGrpSpPr/>
-          <p:nvPr/>
-        </p:nvGrpSpPr>
-        <p:grpSpPr>
-          <a:xfrm>
-            <a:off x="4437878" y="1333907"/>
-            <a:ext cx="312793" cy="295086"/>
-            <a:chOff x="5878457" y="3175624"/>
-            <a:chExt cx="312793" cy="295086"/>
-          </a:xfrm>
-        </p:grpSpPr>
         <p:sp>
           <p:nvSpPr>
-            <p:cNvPr id="102" name="Rectangle 101"/>
+            <p:cNvPr id="108" name="Freeform 107"/>
             <p:cNvSpPr/>
             <p:nvPr/>
           </p:nvSpPr>
           <p:spPr>
-            <a:xfrm>
-              <a:off x="5878457" y="3175624"/>
-              <a:ext cx="312793" cy="147543"/>
+            <a:xfrm rot="16200000" flipH="1">
+              <a:off x="5085210" y="5733131"/>
+              <a:ext cx="397933" cy="180531"/>
             </a:xfrm>
-            <a:prstGeom prst="rect">
+            <a:custGeom>
               <a:avLst/>
-            </a:prstGeom>
+              <a:gdLst>
+                <a:gd name="connsiteX0" fmla="*/ 0 w 0"/>
+                <a:gd name="connsiteY0" fmla="*/ 455083 h 455083"/>
+                <a:gd name="connsiteX1" fmla="*/ 0 w 0"/>
+                <a:gd name="connsiteY1" fmla="*/ 0 h 455083"/>
+              </a:gdLst>
+              <a:ahLst/>
+              <a:cxnLst>
+                <a:cxn ang="0">
+                  <a:pos x="connsiteX0" y="connsiteY0"/>
+                </a:cxn>
+                <a:cxn ang="0">
+                  <a:pos x="connsiteX1" y="connsiteY1"/>
+                </a:cxn>
+              </a:cxnLst>
+              <a:rect l="l" t="t" r="r" b="b"/>
+              <a:pathLst>
+                <a:path h="455083">
+                  <a:moveTo>
+                    <a:pt x="0" y="455083"/>
+                  </a:moveTo>
+                  <a:lnTo>
+                    <a:pt x="0" y="0"/>
+                  </a:lnTo>
+                </a:path>
+              </a:pathLst>
+            </a:custGeom>
+            <a:ln>
+              <a:solidFill>
+                <a:schemeClr val="tx1"/>
+              </a:solidFill>
+              <a:headEnd type="none"/>
+              <a:tailEnd type="triangle"/>
+            </a:ln>
+            <a:effectLst/>
           </p:spPr>
           <p:style>
             <a:lnRef idx="2">
-              <a:schemeClr val="dk1"/>
+              <a:schemeClr val="accent1"/>
             </a:lnRef>
-            <a:fillRef idx="1">
-              <a:schemeClr val="lt1"/>
+            <a:fillRef idx="0">
+              <a:schemeClr val="accent1"/>
             </a:fillRef>
-            <a:effectRef idx="0">
-              <a:schemeClr val="dk1"/>
+            <a:effectRef idx="1">
+              <a:schemeClr val="accent1"/>
             </a:effectRef>
             <a:fontRef idx="minor">
-              <a:schemeClr val="dk1"/>
+              <a:schemeClr val="tx1"/>
             </a:fontRef>
           </p:style>
           <p:txBody>
@@ -9530,1088 +10055,20 @@
             <a:lstStyle/>
             <a:p>
               <a:pPr algn="ctr"/>
-              <a:endParaRPr lang="en-US" dirty="0"/>
-            </a:p>
-          </p:txBody>
-        </p:sp>
-        <p:sp>
-          <p:nvSpPr>
-            <p:cNvPr id="103" name="Rectangle 102"/>
-            <p:cNvSpPr/>
-            <p:nvPr/>
-          </p:nvSpPr>
-          <p:spPr>
-            <a:xfrm>
-              <a:off x="5878457" y="3323167"/>
-              <a:ext cx="312793" cy="147543"/>
-            </a:xfrm>
-            <a:prstGeom prst="rect">
-              <a:avLst/>
-            </a:prstGeom>
-          </p:spPr>
-          <p:style>
-            <a:lnRef idx="2">
-              <a:schemeClr val="dk1"/>
-            </a:lnRef>
-            <a:fillRef idx="1">
-              <a:schemeClr val="lt1"/>
-            </a:fillRef>
-            <a:effectRef idx="0">
-              <a:schemeClr val="dk1"/>
-            </a:effectRef>
-            <a:fontRef idx="minor">
-              <a:schemeClr val="dk1"/>
-            </a:fontRef>
-          </p:style>
-          <p:txBody>
-            <a:bodyPr rtlCol="0" anchor="ctr"/>
-            <a:lstStyle/>
-            <a:p>
-              <a:pPr algn="ctr"/>
-              <a:endParaRPr lang="en-US" dirty="0"/>
+              <a:endParaRPr lang="en-US"/>
             </a:p>
           </p:txBody>
         </p:sp>
       </p:grpSp>
       <p:grpSp>
         <p:nvGrpSpPr>
-          <p:cNvPr id="105" name="Group 104"/>
+          <p:cNvPr id="43" name="Group 42"/>
           <p:cNvGrpSpPr/>
           <p:nvPr/>
         </p:nvGrpSpPr>
         <p:grpSpPr>
-          <a:xfrm>
-            <a:off x="5266856" y="1338764"/>
-            <a:ext cx="312793" cy="295086"/>
-            <a:chOff x="5878457" y="3175624"/>
-            <a:chExt cx="312793" cy="295086"/>
-          </a:xfrm>
-        </p:grpSpPr>
-        <p:sp>
-          <p:nvSpPr>
-            <p:cNvPr id="106" name="Rectangle 105"/>
-            <p:cNvSpPr/>
-            <p:nvPr/>
-          </p:nvSpPr>
-          <p:spPr>
-            <a:xfrm>
-              <a:off x="5878457" y="3175624"/>
-              <a:ext cx="312793" cy="147543"/>
-            </a:xfrm>
-            <a:prstGeom prst="rect">
-              <a:avLst/>
-            </a:prstGeom>
-          </p:spPr>
-          <p:style>
-            <a:lnRef idx="2">
-              <a:schemeClr val="dk1"/>
-            </a:lnRef>
-            <a:fillRef idx="1">
-              <a:schemeClr val="lt1"/>
-            </a:fillRef>
-            <a:effectRef idx="0">
-              <a:schemeClr val="dk1"/>
-            </a:effectRef>
-            <a:fontRef idx="minor">
-              <a:schemeClr val="dk1"/>
-            </a:fontRef>
-          </p:style>
-          <p:txBody>
-            <a:bodyPr rtlCol="0" anchor="ctr"/>
-            <a:lstStyle/>
-            <a:p>
-              <a:pPr algn="ctr"/>
-              <a:endParaRPr lang="en-US" dirty="0"/>
-            </a:p>
-          </p:txBody>
-        </p:sp>
-        <p:sp>
-          <p:nvSpPr>
-            <p:cNvPr id="107" name="Rectangle 106"/>
-            <p:cNvSpPr/>
-            <p:nvPr/>
-          </p:nvSpPr>
-          <p:spPr>
-            <a:xfrm>
-              <a:off x="5878457" y="3323167"/>
-              <a:ext cx="312793" cy="147543"/>
-            </a:xfrm>
-            <a:prstGeom prst="rect">
-              <a:avLst/>
-            </a:prstGeom>
-          </p:spPr>
-          <p:style>
-            <a:lnRef idx="2">
-              <a:schemeClr val="dk1"/>
-            </a:lnRef>
-            <a:fillRef idx="1">
-              <a:schemeClr val="lt1"/>
-            </a:fillRef>
-            <a:effectRef idx="0">
-              <a:schemeClr val="dk1"/>
-            </a:effectRef>
-            <a:fontRef idx="minor">
-              <a:schemeClr val="dk1"/>
-            </a:fontRef>
-          </p:style>
-          <p:txBody>
-            <a:bodyPr rtlCol="0" anchor="ctr"/>
-            <a:lstStyle/>
-            <a:p>
-              <a:pPr algn="ctr"/>
-              <a:endParaRPr lang="en-US" dirty="0"/>
-            </a:p>
-          </p:txBody>
-        </p:sp>
-      </p:grpSp>
-      <p:grpSp>
-        <p:nvGrpSpPr>
-          <p:cNvPr id="109" name="Group 108"/>
-          <p:cNvGrpSpPr/>
-          <p:nvPr/>
-        </p:nvGrpSpPr>
-        <p:grpSpPr>
-          <a:xfrm>
-            <a:off x="5998509" y="1343621"/>
-            <a:ext cx="312793" cy="295086"/>
-            <a:chOff x="5878457" y="3175624"/>
-            <a:chExt cx="312793" cy="295086"/>
-          </a:xfrm>
-        </p:grpSpPr>
-        <p:sp>
-          <p:nvSpPr>
-            <p:cNvPr id="110" name="Rectangle 109"/>
-            <p:cNvSpPr/>
-            <p:nvPr/>
-          </p:nvSpPr>
-          <p:spPr>
-            <a:xfrm>
-              <a:off x="5878457" y="3175624"/>
-              <a:ext cx="312793" cy="147543"/>
-            </a:xfrm>
-            <a:prstGeom prst="rect">
-              <a:avLst/>
-            </a:prstGeom>
-          </p:spPr>
-          <p:style>
-            <a:lnRef idx="2">
-              <a:schemeClr val="dk1"/>
-            </a:lnRef>
-            <a:fillRef idx="1">
-              <a:schemeClr val="lt1"/>
-            </a:fillRef>
-            <a:effectRef idx="0">
-              <a:schemeClr val="dk1"/>
-            </a:effectRef>
-            <a:fontRef idx="minor">
-              <a:schemeClr val="dk1"/>
-            </a:fontRef>
-          </p:style>
-          <p:txBody>
-            <a:bodyPr rtlCol="0" anchor="ctr"/>
-            <a:lstStyle/>
-            <a:p>
-              <a:pPr algn="ctr"/>
-              <a:endParaRPr lang="en-US" dirty="0"/>
-            </a:p>
-          </p:txBody>
-        </p:sp>
-        <p:sp>
-          <p:nvSpPr>
-            <p:cNvPr id="111" name="Rectangle 110"/>
-            <p:cNvSpPr/>
-            <p:nvPr/>
-          </p:nvSpPr>
-          <p:spPr>
-            <a:xfrm>
-              <a:off x="5878457" y="3323167"/>
-              <a:ext cx="312793" cy="147543"/>
-            </a:xfrm>
-            <a:prstGeom prst="rect">
-              <a:avLst/>
-            </a:prstGeom>
-          </p:spPr>
-          <p:style>
-            <a:lnRef idx="2">
-              <a:schemeClr val="dk1"/>
-            </a:lnRef>
-            <a:fillRef idx="1">
-              <a:schemeClr val="lt1"/>
-            </a:fillRef>
-            <a:effectRef idx="0">
-              <a:schemeClr val="dk1"/>
-            </a:effectRef>
-            <a:fontRef idx="minor">
-              <a:schemeClr val="dk1"/>
-            </a:fontRef>
-          </p:style>
-          <p:txBody>
-            <a:bodyPr rtlCol="0" anchor="ctr"/>
-            <a:lstStyle/>
-            <a:p>
-              <a:pPr algn="ctr"/>
-              <a:endParaRPr lang="en-US" dirty="0"/>
-            </a:p>
-          </p:txBody>
-        </p:sp>
-      </p:grpSp>
-      <p:cxnSp>
-        <p:nvCxnSpPr>
-          <p:cNvPr id="112" name="Straight Connector 111"/>
-          <p:cNvCxnSpPr/>
-          <p:nvPr/>
-        </p:nvCxnSpPr>
-        <p:spPr>
-          <a:xfrm flipH="1">
-            <a:off x="4598637" y="1101997"/>
-            <a:ext cx="152034" cy="241624"/>
-          </a:xfrm>
-          <a:prstGeom prst="line">
-            <a:avLst/>
-          </a:prstGeom>
-        </p:spPr>
-        <p:style>
-          <a:lnRef idx="2">
-            <a:schemeClr val="dk1"/>
-          </a:lnRef>
-          <a:fillRef idx="1">
-            <a:schemeClr val="lt1"/>
-          </a:fillRef>
-          <a:effectRef idx="0">
-            <a:schemeClr val="dk1"/>
-          </a:effectRef>
-          <a:fontRef idx="minor">
-            <a:schemeClr val="dk1"/>
-          </a:fontRef>
-        </p:style>
-      </p:cxnSp>
-      <p:cxnSp>
-        <p:nvCxnSpPr>
-          <p:cNvPr id="114" name="Straight Connector 113"/>
-          <p:cNvCxnSpPr/>
-          <p:nvPr/>
-        </p:nvCxnSpPr>
-        <p:spPr>
-          <a:xfrm flipH="1">
-            <a:off x="5427615" y="1097140"/>
-            <a:ext cx="152034" cy="241624"/>
-          </a:xfrm>
-          <a:prstGeom prst="line">
-            <a:avLst/>
-          </a:prstGeom>
-        </p:spPr>
-        <p:style>
-          <a:lnRef idx="2">
-            <a:schemeClr val="dk1"/>
-          </a:lnRef>
-          <a:fillRef idx="1">
-            <a:schemeClr val="lt1"/>
-          </a:fillRef>
-          <a:effectRef idx="0">
-            <a:schemeClr val="dk1"/>
-          </a:effectRef>
-          <a:fontRef idx="minor">
-            <a:schemeClr val="dk1"/>
-          </a:fontRef>
-        </p:style>
-      </p:cxnSp>
-      <p:cxnSp>
-        <p:nvCxnSpPr>
-          <p:cNvPr id="115" name="Straight Connector 114"/>
-          <p:cNvCxnSpPr/>
-          <p:nvPr/>
-        </p:nvCxnSpPr>
-        <p:spPr>
-          <a:xfrm>
-            <a:off x="5891352" y="1097140"/>
-            <a:ext cx="306022" cy="246481"/>
-          </a:xfrm>
-          <a:prstGeom prst="line">
-            <a:avLst/>
-          </a:prstGeom>
-        </p:spPr>
-        <p:style>
-          <a:lnRef idx="2">
-            <a:schemeClr val="dk1"/>
-          </a:lnRef>
-          <a:fillRef idx="1">
-            <a:schemeClr val="lt1"/>
-          </a:fillRef>
-          <a:effectRef idx="0">
-            <a:schemeClr val="dk1"/>
-          </a:effectRef>
-          <a:fontRef idx="minor">
-            <a:schemeClr val="dk1"/>
-          </a:fontRef>
-        </p:style>
-      </p:cxnSp>
-      <p:sp>
-        <p:nvSpPr>
-          <p:cNvPr id="62" name="Rectangle 61"/>
-          <p:cNvSpPr/>
-          <p:nvPr/>
-        </p:nvSpPr>
-        <p:spPr>
-          <a:xfrm>
-            <a:off x="4434881" y="3084211"/>
-            <a:ext cx="586320" cy="877895"/>
-          </a:xfrm>
-          <a:prstGeom prst="rect">
-            <a:avLst/>
-          </a:prstGeom>
-        </p:spPr>
-        <p:style>
-          <a:lnRef idx="2">
-            <a:schemeClr val="dk1"/>
-          </a:lnRef>
-          <a:fillRef idx="1">
-            <a:schemeClr val="lt1"/>
-          </a:fillRef>
-          <a:effectRef idx="0">
-            <a:schemeClr val="dk1"/>
-          </a:effectRef>
-          <a:fontRef idx="minor">
-            <a:schemeClr val="dk1"/>
-          </a:fontRef>
-        </p:style>
-        <p:txBody>
-          <a:bodyPr rtlCol="0" anchor="ctr"/>
-          <a:lstStyle/>
-          <a:p>
-            <a:pPr algn="ctr"/>
-            <a:r>
-              <a:rPr lang="en-US" dirty="0" smtClean="0"/>
-              <a:t>ROB</a:t>
-            </a:r>
-            <a:endParaRPr lang="en-US" baseline="-25000" dirty="0"/>
-          </a:p>
-        </p:txBody>
-      </p:sp>
-      <p:sp>
-        <p:nvSpPr>
-          <p:cNvPr id="64" name="Rectangle 63"/>
-          <p:cNvSpPr/>
-          <p:nvPr/>
-        </p:nvSpPr>
-        <p:spPr>
-          <a:xfrm>
-            <a:off x="5360733" y="3778684"/>
-            <a:ext cx="888049" cy="311433"/>
-          </a:xfrm>
-          <a:prstGeom prst="rect">
-            <a:avLst/>
-          </a:prstGeom>
-        </p:spPr>
-        <p:style>
-          <a:lnRef idx="2">
-            <a:schemeClr val="dk1"/>
-          </a:lnRef>
-          <a:fillRef idx="1">
-            <a:schemeClr val="lt1"/>
-          </a:fillRef>
-          <a:effectRef idx="0">
-            <a:schemeClr val="dk1"/>
-          </a:effectRef>
-          <a:fontRef idx="minor">
-            <a:schemeClr val="dk1"/>
-          </a:fontRef>
-        </p:style>
-        <p:txBody>
-          <a:bodyPr rtlCol="0" anchor="ctr"/>
-          <a:lstStyle/>
-          <a:p>
-            <a:pPr algn="ctr"/>
-            <a:r>
-              <a:rPr lang="en-US" dirty="0" smtClean="0"/>
-              <a:t>PC</a:t>
-            </a:r>
-            <a:endParaRPr lang="en-US" baseline="-25000" dirty="0"/>
-          </a:p>
-        </p:txBody>
-      </p:sp>
-      <p:sp>
-        <p:nvSpPr>
-          <p:cNvPr id="67" name="Rectangle 66"/>
-          <p:cNvSpPr/>
-          <p:nvPr/>
-        </p:nvSpPr>
-        <p:spPr>
-          <a:xfrm>
-            <a:off x="5360734" y="3204545"/>
-            <a:ext cx="888049" cy="576104"/>
-          </a:xfrm>
-          <a:prstGeom prst="rect">
-            <a:avLst/>
-          </a:prstGeom>
-        </p:spPr>
-        <p:style>
-          <a:lnRef idx="2">
-            <a:schemeClr val="dk1"/>
-          </a:lnRef>
-          <a:fillRef idx="1">
-            <a:schemeClr val="lt1"/>
-          </a:fillRef>
-          <a:effectRef idx="0">
-            <a:schemeClr val="dk1"/>
-          </a:effectRef>
-          <a:fontRef idx="minor">
-            <a:schemeClr val="dk1"/>
-          </a:fontRef>
-        </p:style>
-        <p:txBody>
-          <a:bodyPr rtlCol="0" anchor="ctr"/>
-          <a:lstStyle/>
-          <a:p>
-            <a:pPr algn="ctr"/>
-            <a:r>
-              <a:rPr lang="en-US" dirty="0" err="1" smtClean="0"/>
-              <a:t>RegFile</a:t>
-            </a:r>
-            <a:endParaRPr lang="en-US" dirty="0"/>
-          </a:p>
-          <a:p>
-            <a:pPr algn="ctr"/>
-            <a:r>
-              <a:rPr lang="en-US" dirty="0" smtClean="0"/>
-              <a:t>state </a:t>
-            </a:r>
-            <a:r>
-              <a:rPr lang="en-US" i="1" dirty="0" smtClean="0"/>
-              <a:t>s</a:t>
-            </a:r>
-          </a:p>
-        </p:txBody>
-      </p:sp>
-      <p:sp>
-        <p:nvSpPr>
-          <p:cNvPr id="74" name="Freeform 73"/>
-          <p:cNvSpPr/>
-          <p:nvPr/>
-        </p:nvSpPr>
-        <p:spPr>
-          <a:xfrm flipH="1" flipV="1">
-            <a:off x="5426538" y="4104365"/>
-            <a:ext cx="397933" cy="242443"/>
-          </a:xfrm>
-          <a:custGeom>
-            <a:avLst/>
-            <a:gdLst>
-              <a:gd name="connsiteX0" fmla="*/ 0 w 0"/>
-              <a:gd name="connsiteY0" fmla="*/ 455083 h 455083"/>
-              <a:gd name="connsiteX1" fmla="*/ 0 w 0"/>
-              <a:gd name="connsiteY1" fmla="*/ 0 h 455083"/>
-            </a:gdLst>
-            <a:ahLst/>
-            <a:cxnLst>
-              <a:cxn ang="0">
-                <a:pos x="connsiteX0" y="connsiteY0"/>
-              </a:cxn>
-              <a:cxn ang="0">
-                <a:pos x="connsiteX1" y="connsiteY1"/>
-              </a:cxn>
-            </a:cxnLst>
-            <a:rect l="l" t="t" r="r" b="b"/>
-            <a:pathLst>
-              <a:path h="455083">
-                <a:moveTo>
-                  <a:pt x="0" y="455083"/>
-                </a:moveTo>
-                <a:lnTo>
-                  <a:pt x="0" y="0"/>
-                </a:lnTo>
-              </a:path>
-            </a:pathLst>
-          </a:custGeom>
-          <a:ln>
-            <a:solidFill>
-              <a:schemeClr val="tx1"/>
-            </a:solidFill>
-            <a:headEnd type="none"/>
-            <a:tailEnd type="triangle"/>
-          </a:ln>
-          <a:effectLst/>
-        </p:spPr>
-        <p:style>
-          <a:lnRef idx="2">
-            <a:schemeClr val="accent1"/>
-          </a:lnRef>
-          <a:fillRef idx="0">
-            <a:schemeClr val="accent1"/>
-          </a:fillRef>
-          <a:effectRef idx="1">
-            <a:schemeClr val="accent1"/>
-          </a:effectRef>
-          <a:fontRef idx="minor">
-            <a:schemeClr val="tx1"/>
-          </a:fontRef>
-        </p:style>
-        <p:txBody>
-          <a:bodyPr rtlCol="0" anchor="ctr"/>
-          <a:lstStyle/>
-          <a:p>
-            <a:pPr algn="ctr"/>
-            <a:endParaRPr lang="en-US"/>
-          </a:p>
-        </p:txBody>
-      </p:sp>
-      <p:cxnSp>
-        <p:nvCxnSpPr>
-          <p:cNvPr id="75" name="Straight Connector 74"/>
-          <p:cNvCxnSpPr/>
-          <p:nvPr/>
-        </p:nvCxnSpPr>
-        <p:spPr>
-          <a:xfrm flipV="1">
-            <a:off x="4728041" y="2703661"/>
-            <a:ext cx="0" cy="380550"/>
-          </a:xfrm>
-          <a:prstGeom prst="line">
-            <a:avLst/>
-          </a:prstGeom>
-        </p:spPr>
-        <p:style>
-          <a:lnRef idx="2">
-            <a:schemeClr val="dk1"/>
-          </a:lnRef>
-          <a:fillRef idx="1">
-            <a:schemeClr val="lt1"/>
-          </a:fillRef>
-          <a:effectRef idx="0">
-            <a:schemeClr val="dk1"/>
-          </a:effectRef>
-          <a:fontRef idx="minor">
-            <a:schemeClr val="dk1"/>
-          </a:fontRef>
-        </p:style>
-      </p:cxnSp>
-      <p:cxnSp>
-        <p:nvCxnSpPr>
-          <p:cNvPr id="81" name="Straight Connector 80"/>
-          <p:cNvCxnSpPr/>
-          <p:nvPr/>
-        </p:nvCxnSpPr>
-        <p:spPr>
-          <a:xfrm flipV="1">
-            <a:off x="2554674" y="3972180"/>
-            <a:ext cx="0" cy="275167"/>
-          </a:xfrm>
-          <a:prstGeom prst="line">
-            <a:avLst/>
-          </a:prstGeom>
-        </p:spPr>
-        <p:style>
-          <a:lnRef idx="2">
-            <a:schemeClr val="dk1"/>
-          </a:lnRef>
-          <a:fillRef idx="1">
-            <a:schemeClr val="lt1"/>
-          </a:fillRef>
-          <a:effectRef idx="0">
-            <a:schemeClr val="dk1"/>
-          </a:effectRef>
-          <a:fontRef idx="minor">
-            <a:schemeClr val="dk1"/>
-          </a:fontRef>
-        </p:style>
-      </p:cxnSp>
-      <p:cxnSp>
-        <p:nvCxnSpPr>
-          <p:cNvPr id="82" name="Straight Connector 81"/>
-          <p:cNvCxnSpPr/>
-          <p:nvPr/>
-        </p:nvCxnSpPr>
-        <p:spPr>
-          <a:xfrm flipV="1">
-            <a:off x="1731059" y="3969878"/>
-            <a:ext cx="0" cy="275167"/>
-          </a:xfrm>
-          <a:prstGeom prst="line">
-            <a:avLst/>
-          </a:prstGeom>
-        </p:spPr>
-        <p:style>
-          <a:lnRef idx="2">
-            <a:schemeClr val="dk1"/>
-          </a:lnRef>
-          <a:fillRef idx="1">
-            <a:schemeClr val="lt1"/>
-          </a:fillRef>
-          <a:effectRef idx="0">
-            <a:schemeClr val="dk1"/>
-          </a:effectRef>
-          <a:fontRef idx="minor">
-            <a:schemeClr val="dk1"/>
-          </a:fontRef>
-        </p:style>
-      </p:cxnSp>
-      <p:cxnSp>
-        <p:nvCxnSpPr>
-          <p:cNvPr id="83" name="Straight Connector 82"/>
-          <p:cNvCxnSpPr/>
-          <p:nvPr/>
-        </p:nvCxnSpPr>
-        <p:spPr>
-          <a:xfrm flipV="1">
-            <a:off x="831310" y="3892320"/>
-            <a:ext cx="0" cy="275167"/>
-          </a:xfrm>
-          <a:prstGeom prst="line">
-            <a:avLst/>
-          </a:prstGeom>
-        </p:spPr>
-        <p:style>
-          <a:lnRef idx="2">
-            <a:schemeClr val="dk1"/>
-          </a:lnRef>
-          <a:fillRef idx="1">
-            <a:schemeClr val="lt1"/>
-          </a:fillRef>
-          <a:effectRef idx="0">
-            <a:schemeClr val="dk1"/>
-          </a:effectRef>
-          <a:fontRef idx="minor">
-            <a:schemeClr val="dk1"/>
-          </a:fontRef>
-        </p:style>
-      </p:cxnSp>
-      <p:sp>
-        <p:nvSpPr>
-          <p:cNvPr id="76" name="Rectangle 75"/>
-          <p:cNvSpPr/>
-          <p:nvPr/>
-        </p:nvSpPr>
-        <p:spPr>
-          <a:xfrm>
-            <a:off x="1329730" y="1247170"/>
-            <a:ext cx="1592320" cy="648894"/>
-          </a:xfrm>
-          <a:prstGeom prst="rect">
-            <a:avLst/>
-          </a:prstGeom>
-        </p:spPr>
-        <p:style>
-          <a:lnRef idx="2">
-            <a:schemeClr val="dk1"/>
-          </a:lnRef>
-          <a:fillRef idx="1">
-            <a:schemeClr val="lt1"/>
-          </a:fillRef>
-          <a:effectRef idx="0">
-            <a:schemeClr val="dk1"/>
-          </a:effectRef>
-          <a:fontRef idx="minor">
-            <a:schemeClr val="dk1"/>
-          </a:fontRef>
-        </p:style>
-        <p:txBody>
-          <a:bodyPr rtlCol="0" anchor="ctr"/>
-          <a:lstStyle/>
-          <a:p>
-            <a:pPr algn="ctr"/>
-            <a:r>
-              <a:rPr lang="en-US" dirty="0" smtClean="0"/>
-              <a:t>Main memory</a:t>
-            </a:r>
-            <a:endParaRPr lang="en-US" baseline="-25000" dirty="0"/>
-          </a:p>
-        </p:txBody>
-      </p:sp>
-      <p:sp>
-        <p:nvSpPr>
-          <p:cNvPr id="89" name="Oval 88"/>
-          <p:cNvSpPr/>
-          <p:nvPr/>
-        </p:nvSpPr>
-        <p:spPr>
-          <a:xfrm>
-            <a:off x="4092370" y="4281457"/>
-            <a:ext cx="1058332" cy="635000"/>
-          </a:xfrm>
-          <a:prstGeom prst="ellipse">
-            <a:avLst/>
-          </a:prstGeom>
-        </p:spPr>
-        <p:style>
-          <a:lnRef idx="2">
-            <a:schemeClr val="dk1"/>
-          </a:lnRef>
-          <a:fillRef idx="1">
-            <a:schemeClr val="lt1"/>
-          </a:fillRef>
-          <a:effectRef idx="0">
-            <a:schemeClr val="dk1"/>
-          </a:effectRef>
-          <a:fontRef idx="minor">
-            <a:schemeClr val="dk1"/>
-          </a:fontRef>
-        </p:style>
-        <p:txBody>
-          <a:bodyPr rtlCol="0" anchor="ctr"/>
-          <a:lstStyle/>
-          <a:p>
-            <a:pPr algn="ctr"/>
-            <a:r>
-              <a:rPr lang="en-US" dirty="0" smtClean="0"/>
-              <a:t>Fetch</a:t>
-            </a:r>
-            <a:endParaRPr lang="en-US" dirty="0"/>
-          </a:p>
-        </p:txBody>
-      </p:sp>
-      <p:sp>
-        <p:nvSpPr>
-          <p:cNvPr id="99" name="Freeform 98"/>
-          <p:cNvSpPr/>
-          <p:nvPr/>
-        </p:nvSpPr>
-        <p:spPr>
-          <a:xfrm flipV="1">
-            <a:off x="5004183" y="3477440"/>
-            <a:ext cx="352189" cy="45719"/>
-          </a:xfrm>
-          <a:custGeom>
-            <a:avLst/>
-            <a:gdLst>
-              <a:gd name="connsiteX0" fmla="*/ 0 w 391584"/>
-              <a:gd name="connsiteY0" fmla="*/ 0 h 0"/>
-              <a:gd name="connsiteX1" fmla="*/ 391584 w 391584"/>
-              <a:gd name="connsiteY1" fmla="*/ 0 h 0"/>
-            </a:gdLst>
-            <a:ahLst/>
-            <a:cxnLst>
-              <a:cxn ang="0">
-                <a:pos x="connsiteX0" y="connsiteY0"/>
-              </a:cxn>
-              <a:cxn ang="0">
-                <a:pos x="connsiteX1" y="connsiteY1"/>
-              </a:cxn>
-            </a:cxnLst>
-            <a:rect l="l" t="t" r="r" b="b"/>
-            <a:pathLst>
-              <a:path w="391584">
-                <a:moveTo>
-                  <a:pt x="0" y="0"/>
-                </a:moveTo>
-                <a:lnTo>
-                  <a:pt x="391584" y="0"/>
-                </a:lnTo>
-              </a:path>
-            </a:pathLst>
-          </a:custGeom>
-          <a:ln>
-            <a:solidFill>
-              <a:schemeClr val="tx1"/>
-            </a:solidFill>
-            <a:headEnd type="none"/>
-            <a:tailEnd type="triangle"/>
-          </a:ln>
-          <a:effectLst/>
-        </p:spPr>
-        <p:style>
-          <a:lnRef idx="2">
-            <a:schemeClr val="accent1"/>
-          </a:lnRef>
-          <a:fillRef idx="0">
-            <a:schemeClr val="accent1"/>
-          </a:fillRef>
-          <a:effectRef idx="1">
-            <a:schemeClr val="accent1"/>
-          </a:effectRef>
-          <a:fontRef idx="minor">
-            <a:schemeClr val="tx1"/>
-          </a:fontRef>
-        </p:style>
-        <p:txBody>
-          <a:bodyPr rtlCol="0" anchor="ctr"/>
-          <a:lstStyle/>
-          <a:p>
-            <a:pPr algn="ctr"/>
-            <a:endParaRPr lang="en-US"/>
-          </a:p>
-        </p:txBody>
-      </p:sp>
-      <p:sp>
-        <p:nvSpPr>
-          <p:cNvPr id="38" name="Freeform 37"/>
-          <p:cNvSpPr/>
-          <p:nvPr/>
-        </p:nvSpPr>
-        <p:spPr>
-          <a:xfrm>
-            <a:off x="5150702" y="3523159"/>
-            <a:ext cx="211667" cy="418052"/>
-          </a:xfrm>
-          <a:custGeom>
-            <a:avLst/>
-            <a:gdLst>
-              <a:gd name="connsiteX0" fmla="*/ 0 w 211667"/>
-              <a:gd name="connsiteY0" fmla="*/ 0 h 433917"/>
-              <a:gd name="connsiteX1" fmla="*/ 0 w 211667"/>
-              <a:gd name="connsiteY1" fmla="*/ 433917 h 433917"/>
-              <a:gd name="connsiteX2" fmla="*/ 211667 w 211667"/>
-              <a:gd name="connsiteY2" fmla="*/ 433917 h 433917"/>
-            </a:gdLst>
-            <a:ahLst/>
-            <a:cxnLst>
-              <a:cxn ang="0">
-                <a:pos x="connsiteX0" y="connsiteY0"/>
-              </a:cxn>
-              <a:cxn ang="0">
-                <a:pos x="connsiteX1" y="connsiteY1"/>
-              </a:cxn>
-              <a:cxn ang="0">
-                <a:pos x="connsiteX2" y="connsiteY2"/>
-              </a:cxn>
-            </a:cxnLst>
-            <a:rect l="l" t="t" r="r" b="b"/>
-            <a:pathLst>
-              <a:path w="211667" h="433917">
-                <a:moveTo>
-                  <a:pt x="0" y="0"/>
-                </a:moveTo>
-                <a:lnTo>
-                  <a:pt x="0" y="433917"/>
-                </a:lnTo>
-                <a:lnTo>
-                  <a:pt x="211667" y="433917"/>
-                </a:lnTo>
-              </a:path>
-            </a:pathLst>
-          </a:custGeom>
-          <a:ln>
-            <a:solidFill>
-              <a:schemeClr val="tx1"/>
-            </a:solidFill>
-            <a:headEnd type="oval"/>
-            <a:tailEnd type="triangle"/>
-          </a:ln>
-          <a:effectLst/>
-        </p:spPr>
-        <p:style>
-          <a:lnRef idx="2">
-            <a:schemeClr val="accent1"/>
-          </a:lnRef>
-          <a:fillRef idx="0">
-            <a:schemeClr val="accent1"/>
-          </a:fillRef>
-          <a:effectRef idx="1">
-            <a:schemeClr val="accent1"/>
-          </a:effectRef>
-          <a:fontRef idx="minor">
-            <a:schemeClr val="tx1"/>
-          </a:fontRef>
-        </p:style>
-        <p:txBody>
-          <a:bodyPr rtlCol="0" anchor="ctr"/>
-          <a:lstStyle/>
-          <a:p>
-            <a:pPr algn="ctr"/>
-            <a:endParaRPr lang="en-US"/>
-          </a:p>
-        </p:txBody>
-      </p:sp>
-      <p:sp>
-        <p:nvSpPr>
-          <p:cNvPr id="100" name="Rectangle 99"/>
-          <p:cNvSpPr/>
-          <p:nvPr/>
-        </p:nvSpPr>
-        <p:spPr>
-          <a:xfrm>
-            <a:off x="5325362" y="4344506"/>
-            <a:ext cx="923421" cy="571951"/>
-          </a:xfrm>
-          <a:prstGeom prst="rect">
-            <a:avLst/>
-          </a:prstGeom>
-        </p:spPr>
-        <p:style>
-          <a:lnRef idx="2">
-            <a:schemeClr val="dk1"/>
-          </a:lnRef>
-          <a:fillRef idx="1">
-            <a:schemeClr val="lt1"/>
-          </a:fillRef>
-          <a:effectRef idx="0">
-            <a:schemeClr val="dk1"/>
-          </a:effectRef>
-          <a:fontRef idx="minor">
-            <a:schemeClr val="dk1"/>
-          </a:fontRef>
-        </p:style>
-        <p:txBody>
-          <a:bodyPr rtlCol="0" anchor="ctr"/>
-          <a:lstStyle/>
-          <a:p>
-            <a:pPr algn="ctr"/>
-            <a:r>
-              <a:rPr lang="en-US" dirty="0" smtClean="0"/>
-              <a:t>Branch</a:t>
-            </a:r>
-          </a:p>
-          <a:p>
-            <a:pPr algn="ctr"/>
-            <a:r>
-              <a:rPr lang="en-US" dirty="0" err="1" smtClean="0"/>
-              <a:t>Pred</a:t>
-            </a:r>
-            <a:endParaRPr lang="en-US" dirty="0"/>
-          </a:p>
-        </p:txBody>
-      </p:sp>
-      <p:sp>
-        <p:nvSpPr>
-          <p:cNvPr id="104" name="Freeform 103"/>
-          <p:cNvSpPr/>
-          <p:nvPr/>
-        </p:nvSpPr>
-        <p:spPr>
-          <a:xfrm flipH="1">
-            <a:off x="4291334" y="3941211"/>
-            <a:ext cx="397933" cy="340246"/>
-          </a:xfrm>
-          <a:custGeom>
-            <a:avLst/>
-            <a:gdLst>
-              <a:gd name="connsiteX0" fmla="*/ 0 w 0"/>
-              <a:gd name="connsiteY0" fmla="*/ 455083 h 455083"/>
-              <a:gd name="connsiteX1" fmla="*/ 0 w 0"/>
-              <a:gd name="connsiteY1" fmla="*/ 0 h 455083"/>
-            </a:gdLst>
-            <a:ahLst/>
-            <a:cxnLst>
-              <a:cxn ang="0">
-                <a:pos x="connsiteX0" y="connsiteY0"/>
-              </a:cxn>
-              <a:cxn ang="0">
-                <a:pos x="connsiteX1" y="connsiteY1"/>
-              </a:cxn>
-            </a:cxnLst>
-            <a:rect l="l" t="t" r="r" b="b"/>
-            <a:pathLst>
-              <a:path h="455083">
-                <a:moveTo>
-                  <a:pt x="0" y="455083"/>
-                </a:moveTo>
-                <a:lnTo>
-                  <a:pt x="0" y="0"/>
-                </a:lnTo>
-              </a:path>
-            </a:pathLst>
-          </a:custGeom>
-          <a:ln>
-            <a:solidFill>
-              <a:schemeClr val="tx1"/>
-            </a:solidFill>
-            <a:headEnd type="none"/>
-            <a:tailEnd type="triangle"/>
-          </a:ln>
-          <a:effectLst/>
-        </p:spPr>
-        <p:style>
-          <a:lnRef idx="2">
-            <a:schemeClr val="accent1"/>
-          </a:lnRef>
-          <a:fillRef idx="0">
-            <a:schemeClr val="accent1"/>
-          </a:fillRef>
-          <a:effectRef idx="1">
-            <a:schemeClr val="accent1"/>
-          </a:effectRef>
-          <a:fontRef idx="minor">
-            <a:schemeClr val="tx1"/>
-          </a:fontRef>
-        </p:style>
-        <p:txBody>
-          <a:bodyPr rtlCol="0" anchor="ctr"/>
-          <a:lstStyle/>
-          <a:p>
-            <a:pPr algn="ctr"/>
-            <a:endParaRPr lang="en-US"/>
-          </a:p>
-        </p:txBody>
-      </p:sp>
-      <p:sp>
-        <p:nvSpPr>
-          <p:cNvPr id="108" name="Freeform 107"/>
-          <p:cNvSpPr/>
-          <p:nvPr/>
-        </p:nvSpPr>
-        <p:spPr>
-          <a:xfrm rot="16200000" flipH="1">
-            <a:off x="5031417" y="4698585"/>
-            <a:ext cx="397933" cy="180531"/>
-          </a:xfrm>
-          <a:custGeom>
-            <a:avLst/>
-            <a:gdLst>
-              <a:gd name="connsiteX0" fmla="*/ 0 w 0"/>
-              <a:gd name="connsiteY0" fmla="*/ 455083 h 455083"/>
-              <a:gd name="connsiteX1" fmla="*/ 0 w 0"/>
-              <a:gd name="connsiteY1" fmla="*/ 0 h 455083"/>
-            </a:gdLst>
-            <a:ahLst/>
-            <a:cxnLst>
-              <a:cxn ang="0">
-                <a:pos x="connsiteX0" y="connsiteY0"/>
-              </a:cxn>
-              <a:cxn ang="0">
-                <a:pos x="connsiteX1" y="connsiteY1"/>
-              </a:cxn>
-            </a:cxnLst>
-            <a:rect l="l" t="t" r="r" b="b"/>
-            <a:pathLst>
-              <a:path h="455083">
-                <a:moveTo>
-                  <a:pt x="0" y="455083"/>
-                </a:moveTo>
-                <a:lnTo>
-                  <a:pt x="0" y="0"/>
-                </a:lnTo>
-              </a:path>
-            </a:pathLst>
-          </a:custGeom>
-          <a:ln>
-            <a:solidFill>
-              <a:schemeClr val="tx1"/>
-            </a:solidFill>
-            <a:headEnd type="none"/>
-            <a:tailEnd type="triangle"/>
-          </a:ln>
-          <a:effectLst/>
-        </p:spPr>
-        <p:style>
-          <a:lnRef idx="2">
-            <a:schemeClr val="accent1"/>
-          </a:lnRef>
-          <a:fillRef idx="0">
-            <a:schemeClr val="accent1"/>
-          </a:fillRef>
-          <a:effectRef idx="1">
-            <a:schemeClr val="accent1"/>
-          </a:effectRef>
-          <a:fontRef idx="minor">
-            <a:schemeClr val="tx1"/>
-          </a:fontRef>
-        </p:style>
-        <p:txBody>
-          <a:bodyPr rtlCol="0" anchor="ctr"/>
-          <a:lstStyle/>
-          <a:p>
-            <a:pPr algn="ctr"/>
-            <a:endParaRPr lang="en-US"/>
-          </a:p>
-        </p:txBody>
-      </p:sp>
-      <p:grpSp>
-        <p:nvGrpSpPr>
-          <p:cNvPr id="43" name="Group 42"/>
-          <p:cNvGrpSpPr/>
-          <p:nvPr/>
-        </p:nvGrpSpPr>
-        <p:grpSpPr>
-          <a:xfrm rot="10800000">
-            <a:off x="3102582" y="968993"/>
+          <a:xfrm rot="5011693">
+            <a:off x="3116339" y="788100"/>
             <a:ext cx="539750" cy="603033"/>
             <a:chOff x="7577667" y="878417"/>
             <a:chExt cx="539750" cy="603033"/>
@@ -10701,7 +10158,7 @@
         </p:nvGrpSpPr>
         <p:grpSpPr>
           <a:xfrm>
-            <a:off x="6040131" y="2428217"/>
+            <a:off x="6323039" y="2697804"/>
             <a:ext cx="539750" cy="603033"/>
             <a:chOff x="7577667" y="878417"/>
             <a:chExt cx="539750" cy="603033"/>
@@ -10786,13 +10243,16 @@
       <p:cxnSp>
         <p:nvCxnSpPr>
           <p:cNvPr id="45" name="Straight Arrow Connector 44"/>
-          <p:cNvCxnSpPr/>
+          <p:cNvCxnSpPr>
+            <a:stCxn id="117" idx="2"/>
+            <a:endCxn id="80" idx="7"/>
+          </p:cNvCxnSpPr>
           <p:nvPr/>
         </p:nvCxnSpPr>
         <p:spPr>
           <a:xfrm flipH="1">
-            <a:off x="3326163" y="1476066"/>
-            <a:ext cx="586044" cy="463671"/>
+            <a:off x="2880775" y="809624"/>
+            <a:ext cx="1557103" cy="946027"/>
           </a:xfrm>
           <a:prstGeom prst="straightConnector1">
             <a:avLst/>
@@ -10824,13 +10284,14 @@
           <p:cNvPr id="121" name="Straight Arrow Connector 120"/>
           <p:cNvCxnSpPr>
             <a:stCxn id="118" idx="3"/>
+            <a:endCxn id="113" idx="7"/>
           </p:cNvCxnSpPr>
           <p:nvPr/>
         </p:nvCxnSpPr>
         <p:spPr>
           <a:xfrm flipH="1">
-            <a:off x="5765908" y="2317375"/>
-            <a:ext cx="225577" cy="386286"/>
+            <a:off x="6142931" y="2495780"/>
+            <a:ext cx="262656" cy="574133"/>
           </a:xfrm>
           <a:prstGeom prst="straightConnector1">
             <a:avLst/>
@@ -10857,6 +10318,128 @@
           </a:fontRef>
         </p:style>
       </p:cxnSp>
+      <p:sp>
+        <p:nvSpPr>
+          <p:cNvPr id="122" name="Rectangle 121"/>
+          <p:cNvSpPr/>
+          <p:nvPr/>
+        </p:nvSpPr>
+        <p:spPr>
+          <a:xfrm>
+            <a:off x="5083919" y="1558358"/>
+            <a:ext cx="486216" cy="348462"/>
+          </a:xfrm>
+          <a:prstGeom prst="rect">
+            <a:avLst/>
+          </a:prstGeom>
+        </p:spPr>
+        <p:style>
+          <a:lnRef idx="2">
+            <a:schemeClr val="dk1"/>
+          </a:lnRef>
+          <a:fillRef idx="1">
+            <a:schemeClr val="lt1"/>
+          </a:fillRef>
+          <a:effectRef idx="0">
+            <a:schemeClr val="dk1"/>
+          </a:effectRef>
+          <a:fontRef idx="minor">
+            <a:schemeClr val="dk1"/>
+          </a:fontRef>
+        </p:style>
+        <p:txBody>
+          <a:bodyPr rtlCol="0" anchor="ctr"/>
+          <a:lstStyle/>
+          <a:p>
+            <a:pPr algn="ctr"/>
+            <a:r>
+              <a:rPr lang="en-US" dirty="0" smtClean="0"/>
+              <a:t>LB</a:t>
+            </a:r>
+            <a:r>
+              <a:rPr lang="en-US" baseline="-25000" dirty="0" smtClean="0"/>
+              <a:t>2</a:t>
+            </a:r>
+            <a:endParaRPr lang="en-US" baseline="-25000" dirty="0"/>
+          </a:p>
+        </p:txBody>
+      </p:sp>
+      <p:sp>
+        <p:nvSpPr>
+          <p:cNvPr id="123" name="Rectangle 122"/>
+          <p:cNvSpPr/>
+          <p:nvPr/>
+        </p:nvSpPr>
+        <p:spPr>
+          <a:xfrm>
+            <a:off x="6236829" y="1552856"/>
+            <a:ext cx="486216" cy="348462"/>
+          </a:xfrm>
+          <a:prstGeom prst="rect">
+            <a:avLst/>
+          </a:prstGeom>
+        </p:spPr>
+        <p:style>
+          <a:lnRef idx="2">
+            <a:schemeClr val="dk1"/>
+          </a:lnRef>
+          <a:fillRef idx="1">
+            <a:schemeClr val="lt1"/>
+          </a:fillRef>
+          <a:effectRef idx="0">
+            <a:schemeClr val="dk1"/>
+          </a:effectRef>
+          <a:fontRef idx="minor">
+            <a:schemeClr val="dk1"/>
+          </a:fontRef>
+        </p:style>
+        <p:txBody>
+          <a:bodyPr rtlCol="0" anchor="ctr"/>
+          <a:lstStyle/>
+          <a:p>
+            <a:pPr algn="ctr"/>
+            <a:r>
+              <a:rPr lang="en-US" dirty="0" err="1" smtClean="0"/>
+              <a:t>LB</a:t>
+            </a:r>
+            <a:r>
+              <a:rPr lang="en-US" baseline="-25000" dirty="0" err="1"/>
+              <a:t>i</a:t>
+            </a:r>
+            <a:endParaRPr lang="en-US" baseline="-25000" dirty="0"/>
+          </a:p>
+        </p:txBody>
+      </p:sp>
+      <p:sp>
+        <p:nvSpPr>
+          <p:cNvPr id="131" name="TextBox 130"/>
+          <p:cNvSpPr txBox="1"/>
+          <p:nvPr/>
+        </p:nvSpPr>
+        <p:spPr>
+          <a:xfrm>
+            <a:off x="5801294" y="1783414"/>
+            <a:ext cx="344039" cy="369332"/>
+          </a:xfrm>
+          <a:prstGeom prst="rect">
+            <a:avLst/>
+          </a:prstGeom>
+          <a:noFill/>
+        </p:spPr>
+        <p:txBody>
+          <a:bodyPr wrap="none" rtlCol="0">
+            <a:spAutoFit/>
+          </a:bodyPr>
+          <a:lstStyle/>
+          <a:p>
+            <a:r>
+              <a:rPr lang="en-US" dirty="0" smtClean="0"/>
+              <a:t>…</a:t>
+            </a:r>
+            <a:endParaRPr lang="en-US" dirty="0"/>
+          </a:p>
+        </p:txBody>
+      </p:sp>
     </p:spTree>
     <p:extLst>
       <p:ext uri="{BB962C8B-B14F-4D97-AF65-F5344CB8AC3E}">
@@ -11496,20 +11079,24 @@
               <a:t>+ </a:t>
             </a:r>
             <a:r>
-              <a:rPr lang="en-US" dirty="0" smtClean="0"/>
+              <a:rPr lang="en-US" smtClean="0"/>
               <a:t>M</a:t>
             </a:r>
             <a:r>
-              <a:rPr lang="en-US" baseline="-25000" dirty="0" smtClean="0"/>
+              <a:rPr lang="en-US" baseline="-25000" smtClean="0"/>
               <a:t>m</a:t>
             </a:r>
             <a:r>
-              <a:rPr lang="en-US" dirty="0" smtClean="0"/>
+              <a:rPr lang="en-US" smtClean="0"/>
               <a:t> </a:t>
             </a:r>
             <a:r>
               <a:rPr lang="en-US" dirty="0"/>
-              <a:t>⊑ </a:t>
+              <a:t>=</a:t>
+            </a:r>
+            <a:r>
+              <a:rPr lang="en-US" smtClean="0"/>
+              <a:t> </a:t>
             </a:r>
             <a:r>
               <a:rPr lang="en-US" dirty="0" smtClean="0"/>

</xml_diff>